<commit_message>
Presentation :: Last modifications
</commit_message>
<xml_diff>
--- a/presentation/Complex Event Processing for Internet of Things.pptx
+++ b/presentation/Complex Event Processing for Internet of Things.pptx
@@ -8,10 +8,10 @@
     <p:sldMasterId id="2147483677" r:id="rId4"/>
   </p:sldMasterIdLst>
   <p:notesMasterIdLst>
-    <p:notesMasterId r:id="rId32"/>
+    <p:notesMasterId r:id="rId31"/>
   </p:notesMasterIdLst>
   <p:handoutMasterIdLst>
-    <p:handoutMasterId r:id="rId33"/>
+    <p:handoutMasterId r:id="rId32"/>
   </p:handoutMasterIdLst>
   <p:sldIdLst>
     <p:sldId id="257" r:id="rId5"/>
@@ -23,24 +23,23 @@
     <p:sldId id="290" r:id="rId11"/>
     <p:sldId id="279" r:id="rId12"/>
     <p:sldId id="268" r:id="rId13"/>
-    <p:sldId id="291" r:id="rId14"/>
-    <p:sldId id="295" r:id="rId15"/>
-    <p:sldId id="292" r:id="rId16"/>
-    <p:sldId id="283" r:id="rId17"/>
-    <p:sldId id="284" r:id="rId18"/>
-    <p:sldId id="293" r:id="rId19"/>
-    <p:sldId id="294" r:id="rId20"/>
-    <p:sldId id="287" r:id="rId21"/>
-    <p:sldId id="288" r:id="rId22"/>
-    <p:sldId id="297" r:id="rId23"/>
-    <p:sldId id="301" r:id="rId24"/>
-    <p:sldId id="298" r:id="rId25"/>
-    <p:sldId id="299" r:id="rId26"/>
-    <p:sldId id="300" r:id="rId27"/>
-    <p:sldId id="280" r:id="rId28"/>
-    <p:sldId id="267" r:id="rId29"/>
-    <p:sldId id="296" r:id="rId30"/>
-    <p:sldId id="282" r:id="rId31"/>
+    <p:sldId id="295" r:id="rId14"/>
+    <p:sldId id="292" r:id="rId15"/>
+    <p:sldId id="283" r:id="rId16"/>
+    <p:sldId id="284" r:id="rId17"/>
+    <p:sldId id="293" r:id="rId18"/>
+    <p:sldId id="294" r:id="rId19"/>
+    <p:sldId id="287" r:id="rId20"/>
+    <p:sldId id="288" r:id="rId21"/>
+    <p:sldId id="297" r:id="rId22"/>
+    <p:sldId id="301" r:id="rId23"/>
+    <p:sldId id="298" r:id="rId24"/>
+    <p:sldId id="299" r:id="rId25"/>
+    <p:sldId id="300" r:id="rId26"/>
+    <p:sldId id="280" r:id="rId27"/>
+    <p:sldId id="267" r:id="rId28"/>
+    <p:sldId id="296" r:id="rId29"/>
+    <p:sldId id="282" r:id="rId30"/>
   </p:sldIdLst>
   <p:sldSz cx="9144000" cy="6858000" type="screen4x3"/>
   <p:notesSz cx="6858000" cy="9144000"/>
@@ -291,7 +290,7 @@
             <a:fld id="{2DE2638D-C9D0-4AA9-AB04-BEA50A53D0F6}" type="datetime1">
               <a:rPr lang="fr-FR" altLang="fr-FR"/>
               <a:pPr/>
-              <a:t>31/08/2019</a:t>
+              <a:t>01/09/2019</a:t>
             </a:fld>
             <a:endParaRPr lang="fr-FR" altLang="fr-FR"/>
           </a:p>
@@ -474,7 +473,7 @@
           <a:p>
             <a:fld id="{DEDA8D75-7362-43DE-8133-DD6A5EB80F21}" type="datetimeFigureOut">
               <a:rPr lang="fr-BE" smtClean="0"/>
-              <a:t>31-08-19</a:t>
+              <a:t>01-09-19</a:t>
             </a:fld>
             <a:endParaRPr lang="fr-BE"/>
           </a:p>
@@ -3739,14 +3738,14 @@
           </a:ln>
           <a:extLst>
             <a:ext uri="{909E8E84-426E-40dd-AFC4-6F175D3DCCD1}">
-              <a14:hiddenFill xmlns:a14="http://schemas.microsoft.com/office/drawing/2010/main" xmlns:p="http://schemas.openxmlformats.org/presentationml/2006/main" xmlns:r="http://schemas.openxmlformats.org/officeDocument/2006/relationships" xmlns:a="http://schemas.openxmlformats.org/drawingml/2006/main" xmlns="">
+              <a14:hiddenFill xmlns="" xmlns:a="http://schemas.openxmlformats.org/drawingml/2006/main" xmlns:r="http://schemas.openxmlformats.org/officeDocument/2006/relationships" xmlns:p="http://schemas.openxmlformats.org/presentationml/2006/main" xmlns:a14="http://schemas.microsoft.com/office/drawing/2010/main">
                 <a:solidFill>
                   <a:srgbClr val="FFFFFF"/>
                 </a:solidFill>
               </a14:hiddenFill>
             </a:ext>
             <a:ext uri="{91240B29-F687-4f45-9708-019B960494DF}">
-              <a14:hiddenLine xmlns:a14="http://schemas.microsoft.com/office/drawing/2010/main" xmlns:p="http://schemas.openxmlformats.org/presentationml/2006/main" xmlns:r="http://schemas.openxmlformats.org/officeDocument/2006/relationships" xmlns:a="http://schemas.openxmlformats.org/drawingml/2006/main" xmlns="" w="9525">
+              <a14:hiddenLine xmlns="" xmlns:a="http://schemas.openxmlformats.org/drawingml/2006/main" xmlns:r="http://schemas.openxmlformats.org/officeDocument/2006/relationships" xmlns:p="http://schemas.openxmlformats.org/presentationml/2006/main" xmlns:a14="http://schemas.microsoft.com/office/drawing/2010/main" w="9525">
                 <a:solidFill>
                   <a:srgbClr val="000000"/>
                 </a:solidFill>
@@ -3983,14 +3982,14 @@
           </a:ln>
           <a:extLst>
             <a:ext uri="{909E8E84-426E-40dd-AFC4-6F175D3DCCD1}">
-              <a14:hiddenFill xmlns:a14="http://schemas.microsoft.com/office/drawing/2010/main" xmlns:p="http://schemas.openxmlformats.org/presentationml/2006/main" xmlns:r="http://schemas.openxmlformats.org/officeDocument/2006/relationships" xmlns:a="http://schemas.openxmlformats.org/drawingml/2006/main" xmlns="">
+              <a14:hiddenFill xmlns="" xmlns:a="http://schemas.openxmlformats.org/drawingml/2006/main" xmlns:r="http://schemas.openxmlformats.org/officeDocument/2006/relationships" xmlns:p="http://schemas.openxmlformats.org/presentationml/2006/main" xmlns:a14="http://schemas.microsoft.com/office/drawing/2010/main">
                 <a:solidFill>
                   <a:srgbClr val="FFFFFF"/>
                 </a:solidFill>
               </a14:hiddenFill>
             </a:ext>
             <a:ext uri="{91240B29-F687-4f45-9708-019B960494DF}">
-              <a14:hiddenLine xmlns:a14="http://schemas.microsoft.com/office/drawing/2010/main" xmlns:p="http://schemas.openxmlformats.org/presentationml/2006/main" xmlns:r="http://schemas.openxmlformats.org/officeDocument/2006/relationships" xmlns:a="http://schemas.openxmlformats.org/drawingml/2006/main" xmlns="" w="9525">
+              <a14:hiddenLine xmlns="" xmlns:a="http://schemas.openxmlformats.org/drawingml/2006/main" xmlns:r="http://schemas.openxmlformats.org/officeDocument/2006/relationships" xmlns:p="http://schemas.openxmlformats.org/presentationml/2006/main" xmlns:a14="http://schemas.microsoft.com/office/drawing/2010/main" w="9525">
                 <a:solidFill>
                   <a:srgbClr val="000000"/>
                 </a:solidFill>
@@ -5293,35 +5292,6 @@
           </a:p>
         </p:txBody>
       </p:sp>
-      <p:pic>
-        <p:nvPicPr>
-          <p:cNvPr id="5" name="Espace réservé du contenu 4" descr="Une image contenant objet&#10;&#10;Description générée automatiquement">
-            <a:extLst>
-              <a:ext uri="{FF2B5EF4-FFF2-40B4-BE49-F238E27FC236}">
-                <a16:creationId xmlns:a16="http://schemas.microsoft.com/office/drawing/2014/main" id="{E4332862-FB97-489E-8C09-1D094BBCDE25}"/>
-              </a:ext>
-            </a:extLst>
-          </p:cNvPr>
-          <p:cNvPicPr>
-            <a:picLocks noGrp="1" noChangeAspect="1"/>
-          </p:cNvPicPr>
-          <p:nvPr>
-            <p:ph idx="1"/>
-          </p:nvPr>
-        </p:nvPicPr>
-        <p:blipFill>
-          <a:blip r:embed="rId2"/>
-          <a:stretch>
-            <a:fillRect/>
-          </a:stretch>
-        </p:blipFill>
-        <p:spPr>
-          <a:xfrm>
-            <a:off x="817174" y="1903479"/>
-            <a:ext cx="7509651" cy="3919404"/>
-          </a:xfrm>
-        </p:spPr>
-      </p:pic>
       <p:sp>
         <p:nvSpPr>
           <p:cNvPr id="2" name="Espace réservé du numéro de diapositive 1">
@@ -5358,180 +5328,6 @@
                 </a:solidFill>
               </a:rPr>
               <a:t>7</a:t>
-            </a:r>
-          </a:p>
-        </p:txBody>
-      </p:sp>
-      <p:sp>
-        <p:nvSpPr>
-          <p:cNvPr id="6" name="ZoneTexte 5">
-            <a:extLst>
-              <a:ext uri="{FF2B5EF4-FFF2-40B4-BE49-F238E27FC236}">
-                <a16:creationId xmlns:a16="http://schemas.microsoft.com/office/drawing/2014/main" id="{109779CE-66A1-4EC9-9708-4A6A59559076}"/>
-              </a:ext>
-            </a:extLst>
-          </p:cNvPr>
-          <p:cNvSpPr txBox="1"/>
-          <p:nvPr/>
-        </p:nvSpPr>
-        <p:spPr>
-          <a:xfrm>
-            <a:off x="735291" y="1216058"/>
-            <a:ext cx="7591534" cy="523220"/>
-          </a:xfrm>
-          <a:prstGeom prst="rect">
-            <a:avLst/>
-          </a:prstGeom>
-          <a:noFill/>
-        </p:spPr>
-        <p:txBody>
-          <a:bodyPr wrap="square" rtlCol="0">
-            <a:spAutoFit/>
-          </a:bodyPr>
-          <a:lstStyle/>
-          <a:p>
-            <a:r>
-              <a:rPr lang="fr-BE" sz="2800" dirty="0"/>
-              <a:t>CEP Engine :</a:t>
-            </a:r>
-          </a:p>
-        </p:txBody>
-      </p:sp>
-    </p:spTree>
-    <p:extLst>
-      <p:ext uri="{BB962C8B-B14F-4D97-AF65-F5344CB8AC3E}">
-        <p14:creationId xmlns:p14="http://schemas.microsoft.com/office/powerpoint/2010/main" val="116079113"/>
-      </p:ext>
-    </p:extLst>
-  </p:cSld>
-  <p:clrMapOvr>
-    <a:masterClrMapping/>
-  </p:clrMapOvr>
-</p:sld>
-</file>
-
-<file path=ppt/slides/slide11.xml><?xml version="1.0" encoding="utf-8"?>
-<p:sld xmlns:a="http://purl.oclc.org/ooxml/drawingml/main" xmlns:r="http://purl.oclc.org/ooxml/officeDocument/relationships" xmlns:p="http://purl.oclc.org/ooxml/presentationml/main">
-  <p:cSld>
-    <p:spTree>
-      <p:nvGrpSpPr>
-        <p:cNvPr id="1" name=""/>
-        <p:cNvGrpSpPr/>
-        <p:nvPr/>
-      </p:nvGrpSpPr>
-      <p:grpSpPr>
-        <a:xfrm>
-          <a:off x="0" y="0"/>
-          <a:ext cx="0" cy="0"/>
-          <a:chOff x="0" y="0"/>
-          <a:chExt cx="0" cy="0"/>
-        </a:xfrm>
-      </p:grpSpPr>
-      <p:sp>
-        <p:nvSpPr>
-          <p:cNvPr id="9218" name="Titre 1"/>
-          <p:cNvSpPr>
-            <a:spLocks noGrp="1"/>
-          </p:cNvSpPr>
-          <p:nvPr>
-            <p:ph type="title"/>
-          </p:nvPr>
-        </p:nvSpPr>
-        <p:spPr bwMode="auto">
-          <a:noFill/>
-          <a:extLst>
-            <a:ext uri="{909E8E84-426E-40DD-AFC4-6F175D3DCCD1}">
-              <a14:hiddenFill xmlns:a14="http://schemas.microsoft.com/office/drawing/2010/main">
-                <a:solidFill>
-                  <a:srgbClr val="FFFFFF"/>
-                </a:solidFill>
-              </a14:hiddenFill>
-            </a:ext>
-            <a:ext uri="{91240B29-F687-4F45-9708-019B960494DF}">
-              <a14:hiddenLine xmlns:a14="http://schemas.microsoft.com/office/drawing/2010/main" w="9525">
-                <a:solidFill>
-                  <a:srgbClr val="000000"/>
-                </a:solidFill>
-                <a:miter lim="800%"/>
-                <a:headEnd/>
-                <a:tailEnd/>
-              </a14:hiddenLine>
-            </a:ext>
-          </a:extLst>
-        </p:spPr>
-        <p:txBody>
-          <a:bodyPr vert="horz" wrap="square" lIns="91440" tIns="45720" rIns="91440" bIns="45720" numCol="1" anchor="t" anchorCtr="0" compatLnSpc="1">
-            <a:prstTxWarp prst="textNoShape">
-              <a:avLst/>
-            </a:prstTxWarp>
-          </a:bodyPr>
-          <a:lstStyle/>
-          <a:p>
-            <a:pPr algn="ctr" eaLnBrk="1" hangingPunct="1"/>
-            <a:r>
-              <a:rPr lang="fr-FR" altLang="fr-FR" sz="3600" dirty="0" err="1">
-                <a:latin typeface="Verdana" panose="020B0604030504040204" pitchFamily="34" charset="0"/>
-                <a:ea typeface="ＭＳ Ｐゴシック" panose="020B0600070205080204" pitchFamily="34" charset="-128"/>
-              </a:rPr>
-              <a:t>Complex</a:t>
-            </a:r>
-            <a:r>
-              <a:rPr lang="fr-FR" altLang="fr-FR" sz="3600" dirty="0">
-                <a:latin typeface="Verdana" panose="020B0604030504040204" pitchFamily="34" charset="0"/>
-                <a:ea typeface="ＭＳ Ｐゴシック" panose="020B0600070205080204" pitchFamily="34" charset="-128"/>
-              </a:rPr>
-              <a:t> Event </a:t>
-            </a:r>
-            <a:r>
-              <a:rPr lang="fr-FR" altLang="fr-FR" sz="3600" dirty="0" err="1">
-                <a:latin typeface="Verdana" panose="020B0604030504040204" pitchFamily="34" charset="0"/>
-                <a:ea typeface="ＭＳ Ｐゴシック" panose="020B0600070205080204" pitchFamily="34" charset="-128"/>
-              </a:rPr>
-              <a:t>Processing</a:t>
-            </a:r>
-            <a:endParaRPr lang="fr-FR" altLang="fr-FR" sz="3600" dirty="0">
-              <a:latin typeface="Verdana" panose="020B0604030504040204" pitchFamily="34" charset="0"/>
-              <a:ea typeface="ＭＳ Ｐゴシック" panose="020B0600070205080204" pitchFamily="34" charset="-128"/>
-            </a:endParaRPr>
-          </a:p>
-        </p:txBody>
-      </p:sp>
-      <p:sp>
-        <p:nvSpPr>
-          <p:cNvPr id="2" name="Espace réservé du numéro de diapositive 1">
-            <a:extLst>
-              <a:ext uri="{FF2B5EF4-FFF2-40B4-BE49-F238E27FC236}">
-                <a16:creationId xmlns:a16="http://schemas.microsoft.com/office/drawing/2014/main" id="{DCD75088-0863-48E7-808D-55EE80351927}"/>
-              </a:ext>
-            </a:extLst>
-          </p:cNvPr>
-          <p:cNvSpPr>
-            <a:spLocks noGrp="1"/>
-          </p:cNvSpPr>
-          <p:nvPr>
-            <p:ph type="sldNum" sz="quarter" idx="10"/>
-          </p:nvPr>
-        </p:nvSpPr>
-        <p:spPr>
-          <a:xfrm>
-            <a:off x="7010400" y="6579992"/>
-            <a:ext cx="2133600" cy="365125"/>
-          </a:xfrm>
-        </p:spPr>
-        <p:txBody>
-          <a:bodyPr/>
-          <a:lstStyle/>
-          <a:p>
-            <a:pPr>
-              <a:defRPr/>
-            </a:pPr>
-            <a:r>
-              <a:rPr lang="en-US" dirty="0">
-                <a:solidFill>
-                  <a:schemeClr val="bg1"/>
-                </a:solidFill>
-              </a:rPr>
-              <a:t>8</a:t>
             </a:r>
           </a:p>
         </p:txBody>
@@ -5915,7 +5711,7 @@
 </p:sld>
 </file>
 
-<file path=ppt/slides/slide12.xml><?xml version="1.0" encoding="utf-8"?>
+<file path=ppt/slides/slide11.xml><?xml version="1.0" encoding="utf-8"?>
 <p:sld xmlns:a="http://purl.oclc.org/ooxml/drawingml/main" xmlns:r="http://purl.oclc.org/ooxml/officeDocument/relationships" xmlns:p="http://purl.oclc.org/ooxml/presentationml/main">
   <p:cSld>
     <p:spTree>
@@ -6064,7 +5860,7 @@
                   <a:schemeClr val="bg1"/>
                 </a:solidFill>
               </a:rPr>
-              <a:t>9</a:t>
+              <a:t>8</a:t>
             </a:r>
           </a:p>
         </p:txBody>
@@ -6117,7 +5913,7 @@
 </p:sld>
 </file>
 
-<file path=ppt/slides/slide13.xml><?xml version="1.0" encoding="utf-8"?>
+<file path=ppt/slides/slide12.xml><?xml version="1.0" encoding="utf-8"?>
 <p:sld xmlns:a="http://purl.oclc.org/ooxml/drawingml/main" xmlns:r="http://purl.oclc.org/ooxml/officeDocument/relationships" xmlns:p="http://purl.oclc.org/ooxml/presentationml/main">
   <p:cSld>
     <p:spTree>
@@ -6158,14 +5954,14 @@
           <a:noFill/>
           <a:extLst>
             <a:ext uri="{909E8E84-426E-40dd-AFC4-6F175D3DCCD1}">
-              <a14:hiddenFill xmlns:a14="http://schemas.microsoft.com/office/drawing/2010/main" xmlns:p="http://schemas.openxmlformats.org/presentationml/2006/main" xmlns:r="http://schemas.openxmlformats.org/officeDocument/2006/relationships" xmlns:a="http://schemas.openxmlformats.org/drawingml/2006/main" xmlns="">
+              <a14:hiddenFill xmlns="" xmlns:a="http://schemas.openxmlformats.org/drawingml/2006/main" xmlns:r="http://schemas.openxmlformats.org/officeDocument/2006/relationships" xmlns:p="http://schemas.openxmlformats.org/presentationml/2006/main" xmlns:a14="http://schemas.microsoft.com/office/drawing/2010/main">
                 <a:solidFill>
                   <a:srgbClr val="FFFFFF"/>
                 </a:solidFill>
               </a14:hiddenFill>
             </a:ext>
             <a:ext uri="{91240B29-F687-4f45-9708-019B960494DF}">
-              <a14:hiddenLine xmlns:a14="http://schemas.microsoft.com/office/drawing/2010/main" xmlns:p="http://schemas.openxmlformats.org/presentationml/2006/main" xmlns:r="http://schemas.openxmlformats.org/officeDocument/2006/relationships" xmlns:a="http://schemas.openxmlformats.org/drawingml/2006/main" xmlns="" w="9525">
+              <a14:hiddenLine xmlns="" xmlns:a="http://schemas.openxmlformats.org/drawingml/2006/main" xmlns:r="http://schemas.openxmlformats.org/officeDocument/2006/relationships" xmlns:p="http://schemas.openxmlformats.org/presentationml/2006/main" xmlns:a14="http://schemas.microsoft.com/office/drawing/2010/main" w="9525">
                 <a:solidFill>
                   <a:srgbClr val="000000"/>
                 </a:solidFill>
@@ -6175,7 +5971,7 @@
               </a14:hiddenLine>
             </a:ext>
             <a:ext uri="{FAA26D3D-D897-4be2-8F04-BA451C77F1D7}">
-              <ma14:placeholderFlag xmlns:ma14="http://schemas.microsoft.com/office/mac/drawingml/2011/main" xmlns:p="http://schemas.openxmlformats.org/presentationml/2006/main" xmlns:r="http://schemas.openxmlformats.org/officeDocument/2006/relationships" xmlns:a="http://schemas.openxmlformats.org/drawingml/2006/main" xmlns="" val="1"/>
+              <ma14:placeholderFlag xmlns="" xmlns:a="http://schemas.openxmlformats.org/drawingml/2006/main" xmlns:r="http://schemas.openxmlformats.org/officeDocument/2006/relationships" xmlns:p="http://schemas.openxmlformats.org/presentationml/2006/main" xmlns:ma14="http://schemas.microsoft.com/office/mac/drawingml/2011/main" val="1"/>
             </a:ext>
           </a:extLst>
         </p:spPr>
@@ -6227,7 +6023,7 @@
 </p:sld>
 </file>
 
-<file path=ppt/slides/slide14.xml><?xml version="1.0" encoding="utf-8"?>
+<file path=ppt/slides/slide13.xml><?xml version="1.0" encoding="utf-8"?>
 <p:sld xmlns:a="http://purl.oclc.org/ooxml/drawingml/main" xmlns:r="http://purl.oclc.org/ooxml/officeDocument/relationships" xmlns:p="http://purl.oclc.org/ooxml/presentationml/main">
   <p:cSld>
     <p:spTree>
@@ -6415,7 +6211,7 @@
                   <a:schemeClr val="bg1"/>
                 </a:solidFill>
               </a:rPr>
-              <a:t>10</a:t>
+              <a:t>9</a:t>
             </a:r>
           </a:p>
         </p:txBody>
@@ -6463,7 +6259,7 @@
 </p:sld>
 </file>
 
-<file path=ppt/slides/slide15.xml><?xml version="1.0" encoding="utf-8"?>
+<file path=ppt/slides/slide14.xml><?xml version="1.0" encoding="utf-8"?>
 <p:sld xmlns:a="http://purl.oclc.org/ooxml/drawingml/main" xmlns:r="http://purl.oclc.org/ooxml/officeDocument/relationships" xmlns:p="http://purl.oclc.org/ooxml/presentationml/main">
   <p:cSld>
     <p:spTree>
@@ -6651,7 +6447,7 @@
                   <a:schemeClr val="bg1"/>
                 </a:solidFill>
               </a:rPr>
-              <a:t>11</a:t>
+              <a:t>10</a:t>
             </a:r>
           </a:p>
         </p:txBody>
@@ -6699,7 +6495,7 @@
 </p:sld>
 </file>
 
-<file path=ppt/slides/slide16.xml><?xml version="1.0" encoding="utf-8"?>
+<file path=ppt/slides/slide15.xml><?xml version="1.0" encoding="utf-8"?>
 <p:sld xmlns:a="http://purl.oclc.org/ooxml/drawingml/main" xmlns:r="http://purl.oclc.org/ooxml/officeDocument/relationships" xmlns:p="http://purl.oclc.org/ooxml/presentationml/main">
   <p:cSld>
     <p:spTree>
@@ -6887,7 +6683,7 @@
                   <a:schemeClr val="bg1"/>
                 </a:solidFill>
               </a:rPr>
-              <a:t>12</a:t>
+              <a:t>11</a:t>
             </a:r>
           </a:p>
         </p:txBody>
@@ -6935,7 +6731,7 @@
 </p:sld>
 </file>
 
-<file path=ppt/slides/slide17.xml><?xml version="1.0" encoding="utf-8"?>
+<file path=ppt/slides/slide16.xml><?xml version="1.0" encoding="utf-8"?>
 <p:sld xmlns:a="http://purl.oclc.org/ooxml/drawingml/main" xmlns:r="http://purl.oclc.org/ooxml/officeDocument/relationships" xmlns:p="http://purl.oclc.org/ooxml/presentationml/main">
   <p:cSld>
     <p:spTree>
@@ -6976,14 +6772,14 @@
           <a:noFill/>
           <a:extLst>
             <a:ext uri="{909E8E84-426E-40dd-AFC4-6F175D3DCCD1}">
-              <a14:hiddenFill xmlns:a14="http://schemas.microsoft.com/office/drawing/2010/main" xmlns:p="http://schemas.openxmlformats.org/presentationml/2006/main" xmlns:r="http://schemas.openxmlformats.org/officeDocument/2006/relationships" xmlns:a="http://schemas.openxmlformats.org/drawingml/2006/main" xmlns="">
+              <a14:hiddenFill xmlns="" xmlns:a="http://schemas.openxmlformats.org/drawingml/2006/main" xmlns:r="http://schemas.openxmlformats.org/officeDocument/2006/relationships" xmlns:p="http://schemas.openxmlformats.org/presentationml/2006/main" xmlns:a14="http://schemas.microsoft.com/office/drawing/2010/main">
                 <a:solidFill>
                   <a:srgbClr val="FFFFFF"/>
                 </a:solidFill>
               </a14:hiddenFill>
             </a:ext>
             <a:ext uri="{91240B29-F687-4f45-9708-019B960494DF}">
-              <a14:hiddenLine xmlns:a14="http://schemas.microsoft.com/office/drawing/2010/main" xmlns:p="http://schemas.openxmlformats.org/presentationml/2006/main" xmlns:r="http://schemas.openxmlformats.org/officeDocument/2006/relationships" xmlns:a="http://schemas.openxmlformats.org/drawingml/2006/main" xmlns="" w="9525">
+              <a14:hiddenLine xmlns="" xmlns:a="http://schemas.openxmlformats.org/drawingml/2006/main" xmlns:r="http://schemas.openxmlformats.org/officeDocument/2006/relationships" xmlns:p="http://schemas.openxmlformats.org/presentationml/2006/main" xmlns:a14="http://schemas.microsoft.com/office/drawing/2010/main" w="9525">
                 <a:solidFill>
                   <a:srgbClr val="000000"/>
                 </a:solidFill>
@@ -6993,7 +6789,7 @@
               </a14:hiddenLine>
             </a:ext>
             <a:ext uri="{FAA26D3D-D897-4be2-8F04-BA451C77F1D7}">
-              <ma14:placeholderFlag xmlns:ma14="http://schemas.microsoft.com/office/mac/drawingml/2011/main" xmlns:p="http://schemas.openxmlformats.org/presentationml/2006/main" xmlns:r="http://schemas.openxmlformats.org/officeDocument/2006/relationships" xmlns:a="http://schemas.openxmlformats.org/drawingml/2006/main" xmlns="" val="1"/>
+              <ma14:placeholderFlag xmlns="" xmlns:a="http://schemas.openxmlformats.org/drawingml/2006/main" xmlns:r="http://schemas.openxmlformats.org/officeDocument/2006/relationships" xmlns:p="http://schemas.openxmlformats.org/presentationml/2006/main" xmlns:ma14="http://schemas.microsoft.com/office/mac/drawingml/2011/main" val="1"/>
             </a:ext>
           </a:extLst>
         </p:spPr>
@@ -7029,6 +6825,270 @@
     <p:extLst>
       <p:ext uri="{BB962C8B-B14F-4D97-AF65-F5344CB8AC3E}">
         <p14:creationId xmlns:p14="http://schemas.microsoft.com/office/powerpoint/2010/main" val="2772645515"/>
+      </p:ext>
+    </p:extLst>
+  </p:cSld>
+  <p:clrMapOvr>
+    <a:masterClrMapping/>
+  </p:clrMapOvr>
+</p:sld>
+</file>
+
+<file path=ppt/slides/slide17.xml><?xml version="1.0" encoding="utf-8"?>
+<p:sld xmlns:a="http://purl.oclc.org/ooxml/drawingml/main" xmlns:r="http://purl.oclc.org/ooxml/officeDocument/relationships" xmlns:p="http://purl.oclc.org/ooxml/presentationml/main">
+  <p:cSld>
+    <p:spTree>
+      <p:nvGrpSpPr>
+        <p:cNvPr id="1" name=""/>
+        <p:cNvGrpSpPr/>
+        <p:nvPr/>
+      </p:nvGrpSpPr>
+      <p:grpSpPr>
+        <a:xfrm>
+          <a:off x="0" y="0"/>
+          <a:ext cx="0" cy="0"/>
+          <a:chOff x="0" y="0"/>
+          <a:chExt cx="0" cy="0"/>
+        </a:xfrm>
+      </p:grpSpPr>
+      <p:sp>
+        <p:nvSpPr>
+          <p:cNvPr id="9218" name="Titre 1"/>
+          <p:cNvSpPr>
+            <a:spLocks noGrp="1"/>
+          </p:cNvSpPr>
+          <p:nvPr>
+            <p:ph type="title"/>
+          </p:nvPr>
+        </p:nvSpPr>
+        <p:spPr bwMode="auto">
+          <a:noFill/>
+          <a:extLst>
+            <a:ext uri="{909E8E84-426E-40DD-AFC4-6F175D3DCCD1}">
+              <a14:hiddenFill xmlns:a14="http://schemas.microsoft.com/office/drawing/2010/main">
+                <a:solidFill>
+                  <a:srgbClr val="FFFFFF"/>
+                </a:solidFill>
+              </a14:hiddenFill>
+            </a:ext>
+            <a:ext uri="{91240B29-F687-4F45-9708-019B960494DF}">
+              <a14:hiddenLine xmlns:a14="http://schemas.microsoft.com/office/drawing/2010/main" w="9525">
+                <a:solidFill>
+                  <a:srgbClr val="000000"/>
+                </a:solidFill>
+                <a:miter lim="800%"/>
+                <a:headEnd/>
+                <a:tailEnd/>
+              </a14:hiddenLine>
+            </a:ext>
+          </a:extLst>
+        </p:spPr>
+        <p:txBody>
+          <a:bodyPr vert="horz" wrap="square" lIns="91440" tIns="45720" rIns="91440" bIns="45720" numCol="1" anchor="t" anchorCtr="0" compatLnSpc="1">
+            <a:prstTxWarp prst="textNoShape">
+              <a:avLst/>
+            </a:prstTxWarp>
+          </a:bodyPr>
+          <a:lstStyle/>
+          <a:p>
+            <a:pPr algn="ctr" eaLnBrk="1" hangingPunct="1"/>
+            <a:r>
+              <a:rPr lang="fr-FR" sz="3600" dirty="0" err="1">
+                <a:latin typeface="Verdana" charset="0"/>
+                <a:cs typeface="Verdana" charset="0"/>
+              </a:rPr>
+              <a:t>Problematisation</a:t>
+            </a:r>
+            <a:endParaRPr lang="fr-FR" altLang="fr-FR" sz="3600" dirty="0">
+              <a:latin typeface="Verdana" panose="020B0604030504040204" pitchFamily="34" charset="0"/>
+              <a:ea typeface="ＭＳ Ｐゴシック" panose="020B0600070205080204" pitchFamily="34" charset="-128"/>
+            </a:endParaRPr>
+          </a:p>
+        </p:txBody>
+      </p:sp>
+      <p:sp>
+        <p:nvSpPr>
+          <p:cNvPr id="3" name="Espace réservé du contenu 2"/>
+          <p:cNvSpPr>
+            <a:spLocks noGrp="1"/>
+          </p:cNvSpPr>
+          <p:nvPr>
+            <p:ph idx="1"/>
+          </p:nvPr>
+        </p:nvSpPr>
+        <p:spPr>
+          <a:xfrm>
+            <a:off x="457200" y="1166018"/>
+            <a:ext cx="8229600" cy="5215928"/>
+          </a:xfrm>
+        </p:spPr>
+        <p:txBody>
+          <a:bodyPr vert="horz" wrap="square" lIns="91440" tIns="45720" rIns="91440" bIns="45720" numCol="1" anchor="t" anchorCtr="0" compatLnSpc="1">
+            <a:prstTxWarp prst="textNoShape">
+              <a:avLst/>
+            </a:prstTxWarp>
+          </a:bodyPr>
+          <a:lstStyle/>
+          <a:p>
+            <a:r>
+              <a:rPr lang="en-US" altLang="fr-FR" dirty="0">
+                <a:ea typeface="ＭＳ Ｐゴシック" panose="020B0600070205080204" pitchFamily="34" charset="-128"/>
+              </a:rPr>
+              <a:t>”</a:t>
+            </a:r>
+            <a:r>
+              <a:rPr lang="en-US" dirty="0"/>
+              <a:t>Which Internet of Things architecture is adapted for an evolving solution where the connected objects are growing day by day ? </a:t>
+            </a:r>
+            <a:r>
+              <a:rPr lang="en-US" altLang="fr-FR" dirty="0">
+                <a:ea typeface="ＭＳ Ｐゴシック" panose="020B0600070205080204" pitchFamily="34" charset="-128"/>
+              </a:rPr>
+              <a:t>”</a:t>
+            </a:r>
+            <a:endParaRPr lang="en-US" dirty="0"/>
+          </a:p>
+          <a:p>
+            <a:endParaRPr lang="fr-FR" altLang="fr-FR" u="sng" dirty="0">
+              <a:ea typeface="ＭＳ Ｐゴシック" panose="020B0600070205080204" pitchFamily="34" charset="-128"/>
+            </a:endParaRPr>
+          </a:p>
+          <a:p>
+            <a:pPr eaLnBrk="1" hangingPunct="1">
+              <a:buFont typeface="Arial" panose="020B0604020202020204" pitchFamily="34" charset="0"/>
+              <a:buNone/>
+            </a:pPr>
+            <a:r>
+              <a:rPr lang="fr-FR" altLang="fr-FR" u="sng" dirty="0">
+                <a:ea typeface="ＭＳ Ｐゴシック" panose="020B0600070205080204" pitchFamily="34" charset="-128"/>
+              </a:rPr>
+              <a:t>Aspects:</a:t>
+            </a:r>
+          </a:p>
+          <a:p>
+            <a:pPr marL="457200" indent="-457200" eaLnBrk="1" hangingPunct="1">
+              <a:buFont typeface="Arial" panose="020B0604020202020204" pitchFamily="34" charset="0"/>
+              <a:buChar char="•"/>
+            </a:pPr>
+            <a:r>
+              <a:rPr lang="fr-FR" altLang="fr-FR" dirty="0" err="1">
+                <a:ea typeface="ＭＳ Ｐゴシック" panose="020B0600070205080204" pitchFamily="34" charset="-128"/>
+              </a:rPr>
+              <a:t>Scalability</a:t>
+            </a:r>
+            <a:endParaRPr lang="fr-FR" altLang="fr-FR" dirty="0">
+              <a:ea typeface="ＭＳ Ｐゴシック" panose="020B0600070205080204" pitchFamily="34" charset="-128"/>
+            </a:endParaRPr>
+          </a:p>
+          <a:p>
+            <a:pPr marL="457200" indent="-457200" eaLnBrk="1" hangingPunct="1">
+              <a:buFont typeface="Arial" panose="020B0604020202020204" pitchFamily="34" charset="0"/>
+              <a:buChar char="•"/>
+            </a:pPr>
+            <a:r>
+              <a:rPr lang="fr-FR" altLang="fr-FR" dirty="0" err="1">
+                <a:ea typeface="ＭＳ Ｐゴシック" panose="020B0600070205080204" pitchFamily="34" charset="-128"/>
+              </a:rPr>
+              <a:t>Reliability</a:t>
+            </a:r>
+            <a:endParaRPr lang="fr-FR" altLang="fr-FR" dirty="0">
+              <a:ea typeface="ＭＳ Ｐゴシック" panose="020B0600070205080204" pitchFamily="34" charset="-128"/>
+            </a:endParaRPr>
+          </a:p>
+          <a:p>
+            <a:pPr marL="457200" indent="-457200" eaLnBrk="1" hangingPunct="1">
+              <a:buFont typeface="Arial" panose="020B0604020202020204" pitchFamily="34" charset="0"/>
+              <a:buChar char="•"/>
+            </a:pPr>
+            <a:r>
+              <a:rPr lang="fr-FR" altLang="fr-FR" dirty="0" err="1">
+                <a:ea typeface="ＭＳ Ｐゴシック" panose="020B0600070205080204" pitchFamily="34" charset="-128"/>
+              </a:rPr>
+              <a:t>Monitorability</a:t>
+            </a:r>
+            <a:endParaRPr lang="fr-FR" altLang="fr-FR" dirty="0">
+              <a:ea typeface="ＭＳ Ｐゴシック" panose="020B0600070205080204" pitchFamily="34" charset="-128"/>
+            </a:endParaRPr>
+          </a:p>
+          <a:p>
+            <a:pPr marL="457200" indent="-457200" eaLnBrk="1" hangingPunct="1">
+              <a:buFont typeface="Arial" panose="020B0604020202020204" pitchFamily="34" charset="0"/>
+              <a:buChar char="•"/>
+            </a:pPr>
+            <a:r>
+              <a:rPr lang="fr-FR" altLang="fr-FR" dirty="0" err="1">
+                <a:ea typeface="ＭＳ Ｐゴシック" panose="020B0600070205080204" pitchFamily="34" charset="-128"/>
+              </a:rPr>
+              <a:t>Extensibility</a:t>
+            </a:r>
+            <a:endParaRPr lang="fr-FR" altLang="fr-FR" dirty="0">
+              <a:ea typeface="ＭＳ Ｐゴシック" panose="020B0600070205080204" pitchFamily="34" charset="-128"/>
+            </a:endParaRPr>
+          </a:p>
+          <a:p>
+            <a:pPr eaLnBrk="1" hangingPunct="1">
+              <a:buFont typeface="Arial" panose="020B0604020202020204" pitchFamily="34" charset="0"/>
+              <a:buNone/>
+            </a:pPr>
+            <a:endParaRPr lang="fr-FR" altLang="fr-FR" u="sng" dirty="0">
+              <a:ea typeface="ＭＳ Ｐゴシック" panose="020B0600070205080204" pitchFamily="34" charset="-128"/>
+            </a:endParaRPr>
+          </a:p>
+          <a:p>
+            <a:pPr eaLnBrk="1" hangingPunct="1">
+              <a:buFont typeface="Arial" panose="020B0604020202020204" pitchFamily="34" charset="0"/>
+              <a:buNone/>
+            </a:pPr>
+            <a:endParaRPr lang="fr-FR" altLang="fr-FR" u="sng" dirty="0">
+              <a:ea typeface="ＭＳ Ｐゴシック" panose="020B0600070205080204" pitchFamily="34" charset="-128"/>
+            </a:endParaRPr>
+          </a:p>
+        </p:txBody>
+      </p:sp>
+      <p:sp>
+        <p:nvSpPr>
+          <p:cNvPr id="2" name="Espace réservé du numéro de diapositive 1">
+            <a:extLst>
+              <a:ext uri="{FF2B5EF4-FFF2-40B4-BE49-F238E27FC236}">
+                <a16:creationId xmlns:a16="http://schemas.microsoft.com/office/drawing/2014/main" id="{DCD75088-0863-48E7-808D-55EE80351927}"/>
+              </a:ext>
+            </a:extLst>
+          </p:cNvPr>
+          <p:cNvSpPr>
+            <a:spLocks noGrp="1"/>
+          </p:cNvSpPr>
+          <p:nvPr>
+            <p:ph type="sldNum" sz="quarter" idx="10"/>
+          </p:nvPr>
+        </p:nvSpPr>
+        <p:spPr>
+          <a:xfrm>
+            <a:off x="7010400" y="6583362"/>
+            <a:ext cx="2133600" cy="365125"/>
+          </a:xfrm>
+        </p:spPr>
+        <p:txBody>
+          <a:bodyPr/>
+          <a:lstStyle/>
+          <a:p>
+            <a:pPr>
+              <a:defRPr/>
+            </a:pPr>
+            <a:r>
+              <a:rPr lang="en-US" dirty="0">
+                <a:solidFill>
+                  <a:schemeClr val="bg1"/>
+                </a:solidFill>
+              </a:rPr>
+              <a:t>12</a:t>
+            </a:r>
+          </a:p>
+        </p:txBody>
+      </p:sp>
+    </p:spTree>
+    <p:extLst>
+      <p:ext uri="{BB962C8B-B14F-4D97-AF65-F5344CB8AC3E}">
+        <p14:creationId xmlns:p14="http://schemas.microsoft.com/office/powerpoint/2010/main" val="1504505779"/>
       </p:ext>
     </p:extLst>
   </p:cSld>
@@ -7135,22 +7195,79 @@
           <a:lstStyle/>
           <a:p>
             <a:r>
-              <a:rPr lang="en-US" altLang="fr-FR" dirty="0">
+              <a:rPr lang="fr-FR" altLang="fr-FR" b="1" u="sng" dirty="0" err="1">
                 <a:ea typeface="ＭＳ Ｐゴシック" panose="020B0600070205080204" pitchFamily="34" charset="-128"/>
               </a:rPr>
-              <a:t>”</a:t>
-            </a:r>
-            <a:r>
-              <a:rPr lang="en-US" dirty="0"/>
-              <a:t>Which Internet of Things architecture is adapted for an evolving solution where the connected objects are growing day by day ? </a:t>
-            </a:r>
-            <a:r>
-              <a:rPr lang="en-US" altLang="fr-FR" dirty="0">
+              <a:t>Scalability</a:t>
+            </a:r>
+            <a:r>
+              <a:rPr lang="fr-FR" altLang="fr-FR" b="1" u="sng" dirty="0">
                 <a:ea typeface="ＭＳ Ｐゴシック" panose="020B0600070205080204" pitchFamily="34" charset="-128"/>
               </a:rPr>
-              <a:t>”</a:t>
-            </a:r>
-            <a:endParaRPr lang="en-US" dirty="0"/>
+              <a:t> :</a:t>
+            </a:r>
+            <a:r>
+              <a:rPr lang="fr-FR" altLang="fr-FR" b="1" dirty="0">
+                <a:ea typeface="ＭＳ Ｐゴシック" panose="020B0600070205080204" pitchFamily="34" charset="-128"/>
+              </a:rPr>
+              <a:t> </a:t>
+            </a:r>
+          </a:p>
+          <a:p>
+            <a:pPr marL="457200" indent="-457200">
+              <a:buFont typeface="Arial" panose="020B0604020202020204" pitchFamily="34" charset="0"/>
+              <a:buChar char="•"/>
+            </a:pPr>
+            <a:r>
+              <a:rPr lang="fr-BE" dirty="0"/>
+              <a:t>Hardware </a:t>
+            </a:r>
+            <a:r>
+              <a:rPr lang="fr-BE" dirty="0" err="1"/>
+              <a:t>scalability</a:t>
+            </a:r>
+            <a:r>
+              <a:rPr lang="fr-BE" dirty="0"/>
+              <a:t> </a:t>
+            </a:r>
+          </a:p>
+          <a:p>
+            <a:pPr marL="457200" indent="-457200">
+              <a:buFont typeface="Arial" panose="020B0604020202020204" pitchFamily="34" charset="0"/>
+              <a:buChar char="•"/>
+            </a:pPr>
+            <a:endParaRPr lang="fr-BE" dirty="0"/>
+          </a:p>
+          <a:p>
+            <a:pPr marL="457200" indent="-457200">
+              <a:buFont typeface="Arial" panose="020B0604020202020204" pitchFamily="34" charset="0"/>
+              <a:buChar char="•"/>
+            </a:pPr>
+            <a:endParaRPr lang="fr-BE" dirty="0"/>
+          </a:p>
+          <a:p>
+            <a:pPr marL="457200" indent="-457200">
+              <a:buFont typeface="Arial" panose="020B0604020202020204" pitchFamily="34" charset="0"/>
+              <a:buChar char="•"/>
+            </a:pPr>
+            <a:endParaRPr lang="fr-BE" dirty="0"/>
+          </a:p>
+          <a:p>
+            <a:pPr marL="457200" indent="-457200">
+              <a:buFont typeface="Arial" panose="020B0604020202020204" pitchFamily="34" charset="0"/>
+              <a:buChar char="•"/>
+            </a:pPr>
+            <a:endParaRPr lang="fr-BE" dirty="0"/>
+          </a:p>
+          <a:p>
+            <a:pPr marL="457200" indent="-457200">
+              <a:buFont typeface="Arial" panose="020B0604020202020204" pitchFamily="34" charset="0"/>
+              <a:buChar char="•"/>
+            </a:pPr>
+            <a:endParaRPr lang="fr-BE" dirty="0"/>
+          </a:p>
+          <a:p>
+            <a:endParaRPr lang="fr-BE" dirty="0"/>
           </a:p>
           <a:p>
             <a:endParaRPr lang="fr-FR" altLang="fr-FR" u="sng" dirty="0">
@@ -7158,82 +7275,7 @@
             </a:endParaRPr>
           </a:p>
           <a:p>
-            <a:pPr eaLnBrk="1" hangingPunct="1">
-              <a:buFont typeface="Arial" panose="020B0604020202020204" pitchFamily="34" charset="0"/>
-              <a:buNone/>
-            </a:pPr>
-            <a:r>
-              <a:rPr lang="fr-FR" altLang="fr-FR" u="sng" dirty="0">
-                <a:ea typeface="ＭＳ Ｐゴシック" panose="020B0600070205080204" pitchFamily="34" charset="-128"/>
-              </a:rPr>
-              <a:t>Aspects:</a:t>
-            </a:r>
-          </a:p>
-          <a:p>
-            <a:pPr marL="457200" indent="-457200" eaLnBrk="1" hangingPunct="1">
-              <a:buFont typeface="Arial" panose="020B0604020202020204" pitchFamily="34" charset="0"/>
-              <a:buChar char="•"/>
-            </a:pPr>
-            <a:r>
-              <a:rPr lang="fr-FR" altLang="fr-FR" dirty="0" err="1">
-                <a:ea typeface="ＭＳ Ｐゴシック" panose="020B0600070205080204" pitchFamily="34" charset="-128"/>
-              </a:rPr>
-              <a:t>Scalability</a:t>
-            </a:r>
-            <a:endParaRPr lang="fr-FR" altLang="fr-FR" dirty="0">
-              <a:ea typeface="ＭＳ Ｐゴシック" panose="020B0600070205080204" pitchFamily="34" charset="-128"/>
-            </a:endParaRPr>
-          </a:p>
-          <a:p>
-            <a:pPr marL="457200" indent="-457200" eaLnBrk="1" hangingPunct="1">
-              <a:buFont typeface="Arial" panose="020B0604020202020204" pitchFamily="34" charset="0"/>
-              <a:buChar char="•"/>
-            </a:pPr>
-            <a:r>
-              <a:rPr lang="fr-FR" altLang="fr-FR" dirty="0" err="1">
-                <a:ea typeface="ＭＳ Ｐゴシック" panose="020B0600070205080204" pitchFamily="34" charset="-128"/>
-              </a:rPr>
-              <a:t>Reliability</a:t>
-            </a:r>
-            <a:endParaRPr lang="fr-FR" altLang="fr-FR" dirty="0">
-              <a:ea typeface="ＭＳ Ｐゴシック" panose="020B0600070205080204" pitchFamily="34" charset="-128"/>
-            </a:endParaRPr>
-          </a:p>
-          <a:p>
-            <a:pPr marL="457200" indent="-457200" eaLnBrk="1" hangingPunct="1">
-              <a:buFont typeface="Arial" panose="020B0604020202020204" pitchFamily="34" charset="0"/>
-              <a:buChar char="•"/>
-            </a:pPr>
-            <a:r>
-              <a:rPr lang="fr-FR" altLang="fr-FR" dirty="0" err="1">
-                <a:ea typeface="ＭＳ Ｐゴシック" panose="020B0600070205080204" pitchFamily="34" charset="-128"/>
-              </a:rPr>
-              <a:t>Monitorability</a:t>
-            </a:r>
-            <a:endParaRPr lang="fr-FR" altLang="fr-FR" dirty="0">
-              <a:ea typeface="ＭＳ Ｐゴシック" panose="020B0600070205080204" pitchFamily="34" charset="-128"/>
-            </a:endParaRPr>
-          </a:p>
-          <a:p>
-            <a:pPr marL="457200" indent="-457200" eaLnBrk="1" hangingPunct="1">
-              <a:buFont typeface="Arial" panose="020B0604020202020204" pitchFamily="34" charset="0"/>
-              <a:buChar char="•"/>
-            </a:pPr>
-            <a:r>
-              <a:rPr lang="fr-FR" altLang="fr-FR" dirty="0" err="1">
-                <a:ea typeface="ＭＳ Ｐゴシック" panose="020B0600070205080204" pitchFamily="34" charset="-128"/>
-              </a:rPr>
-              <a:t>Extensibility</a:t>
-            </a:r>
-            <a:endParaRPr lang="fr-FR" altLang="fr-FR" dirty="0">
-              <a:ea typeface="ＭＳ Ｐゴシック" panose="020B0600070205080204" pitchFamily="34" charset="-128"/>
-            </a:endParaRPr>
-          </a:p>
-          <a:p>
-            <a:pPr eaLnBrk="1" hangingPunct="1">
-              <a:buFont typeface="Arial" panose="020B0604020202020204" pitchFamily="34" charset="0"/>
-              <a:buNone/>
-            </a:pPr>
+            <a:pPr eaLnBrk="1" hangingPunct="1"/>
             <a:endParaRPr lang="fr-FR" altLang="fr-FR" u="sng" dirty="0">
               <a:ea typeface="ＭＳ Ｐゴシック" panose="020B0600070205080204" pitchFamily="34" charset="-128"/>
             </a:endParaRPr>
@@ -7285,252 +7327,6 @@
                 </a:solidFill>
               </a:rPr>
               <a:t>13</a:t>
-            </a:r>
-          </a:p>
-        </p:txBody>
-      </p:sp>
-    </p:spTree>
-    <p:extLst>
-      <p:ext uri="{BB962C8B-B14F-4D97-AF65-F5344CB8AC3E}">
-        <p14:creationId xmlns:p14="http://schemas.microsoft.com/office/powerpoint/2010/main" val="1504505779"/>
-      </p:ext>
-    </p:extLst>
-  </p:cSld>
-  <p:clrMapOvr>
-    <a:masterClrMapping/>
-  </p:clrMapOvr>
-</p:sld>
-</file>
-
-<file path=ppt/slides/slide19.xml><?xml version="1.0" encoding="utf-8"?>
-<p:sld xmlns:a="http://purl.oclc.org/ooxml/drawingml/main" xmlns:r="http://purl.oclc.org/ooxml/officeDocument/relationships" xmlns:p="http://purl.oclc.org/ooxml/presentationml/main">
-  <p:cSld>
-    <p:spTree>
-      <p:nvGrpSpPr>
-        <p:cNvPr id="1" name=""/>
-        <p:cNvGrpSpPr/>
-        <p:nvPr/>
-      </p:nvGrpSpPr>
-      <p:grpSpPr>
-        <a:xfrm>
-          <a:off x="0" y="0"/>
-          <a:ext cx="0" cy="0"/>
-          <a:chOff x="0" y="0"/>
-          <a:chExt cx="0" cy="0"/>
-        </a:xfrm>
-      </p:grpSpPr>
-      <p:sp>
-        <p:nvSpPr>
-          <p:cNvPr id="9218" name="Titre 1"/>
-          <p:cNvSpPr>
-            <a:spLocks noGrp="1"/>
-          </p:cNvSpPr>
-          <p:nvPr>
-            <p:ph type="title"/>
-          </p:nvPr>
-        </p:nvSpPr>
-        <p:spPr bwMode="auto">
-          <a:noFill/>
-          <a:extLst>
-            <a:ext uri="{909E8E84-426E-40DD-AFC4-6F175D3DCCD1}">
-              <a14:hiddenFill xmlns:a14="http://schemas.microsoft.com/office/drawing/2010/main">
-                <a:solidFill>
-                  <a:srgbClr val="FFFFFF"/>
-                </a:solidFill>
-              </a14:hiddenFill>
-            </a:ext>
-            <a:ext uri="{91240B29-F687-4F45-9708-019B960494DF}">
-              <a14:hiddenLine xmlns:a14="http://schemas.microsoft.com/office/drawing/2010/main" w="9525">
-                <a:solidFill>
-                  <a:srgbClr val="000000"/>
-                </a:solidFill>
-                <a:miter lim="800%"/>
-                <a:headEnd/>
-                <a:tailEnd/>
-              </a14:hiddenLine>
-            </a:ext>
-          </a:extLst>
-        </p:spPr>
-        <p:txBody>
-          <a:bodyPr vert="horz" wrap="square" lIns="91440" tIns="45720" rIns="91440" bIns="45720" numCol="1" anchor="t" anchorCtr="0" compatLnSpc="1">
-            <a:prstTxWarp prst="textNoShape">
-              <a:avLst/>
-            </a:prstTxWarp>
-          </a:bodyPr>
-          <a:lstStyle/>
-          <a:p>
-            <a:pPr algn="ctr" eaLnBrk="1" hangingPunct="1"/>
-            <a:r>
-              <a:rPr lang="fr-FR" sz="3600" dirty="0" err="1">
-                <a:latin typeface="Verdana" charset="0"/>
-                <a:cs typeface="Verdana" charset="0"/>
-              </a:rPr>
-              <a:t>Problematisation</a:t>
-            </a:r>
-            <a:endParaRPr lang="fr-FR" altLang="fr-FR" sz="3600" dirty="0">
-              <a:latin typeface="Verdana" panose="020B0604030504040204" pitchFamily="34" charset="0"/>
-              <a:ea typeface="ＭＳ Ｐゴシック" panose="020B0600070205080204" pitchFamily="34" charset="-128"/>
-            </a:endParaRPr>
-          </a:p>
-        </p:txBody>
-      </p:sp>
-      <p:sp>
-        <p:nvSpPr>
-          <p:cNvPr id="3" name="Espace réservé du contenu 2"/>
-          <p:cNvSpPr>
-            <a:spLocks noGrp="1"/>
-          </p:cNvSpPr>
-          <p:nvPr>
-            <p:ph idx="1"/>
-          </p:nvPr>
-        </p:nvSpPr>
-        <p:spPr>
-          <a:xfrm>
-            <a:off x="457200" y="1166018"/>
-            <a:ext cx="8229600" cy="5215928"/>
-          </a:xfrm>
-        </p:spPr>
-        <p:txBody>
-          <a:bodyPr vert="horz" wrap="square" lIns="91440" tIns="45720" rIns="91440" bIns="45720" numCol="1" anchor="t" anchorCtr="0" compatLnSpc="1">
-            <a:prstTxWarp prst="textNoShape">
-              <a:avLst/>
-            </a:prstTxWarp>
-          </a:bodyPr>
-          <a:lstStyle/>
-          <a:p>
-            <a:r>
-              <a:rPr lang="fr-FR" altLang="fr-FR" b="1" u="sng" dirty="0" err="1">
-                <a:ea typeface="ＭＳ Ｐゴシック" panose="020B0600070205080204" pitchFamily="34" charset="-128"/>
-              </a:rPr>
-              <a:t>Scalability</a:t>
-            </a:r>
-            <a:r>
-              <a:rPr lang="fr-FR" altLang="fr-FR" b="1" u="sng" dirty="0">
-                <a:ea typeface="ＭＳ Ｐゴシック" panose="020B0600070205080204" pitchFamily="34" charset="-128"/>
-              </a:rPr>
-              <a:t> :</a:t>
-            </a:r>
-            <a:r>
-              <a:rPr lang="fr-FR" altLang="fr-FR" b="1" dirty="0">
-                <a:ea typeface="ＭＳ Ｐゴシック" panose="020B0600070205080204" pitchFamily="34" charset="-128"/>
-              </a:rPr>
-              <a:t> </a:t>
-            </a:r>
-          </a:p>
-          <a:p>
-            <a:pPr marL="457200" indent="-457200">
-              <a:buFont typeface="Arial" panose="020B0604020202020204" pitchFamily="34" charset="0"/>
-              <a:buChar char="•"/>
-            </a:pPr>
-            <a:r>
-              <a:rPr lang="fr-BE" dirty="0"/>
-              <a:t>Hardware </a:t>
-            </a:r>
-            <a:r>
-              <a:rPr lang="fr-BE" dirty="0" err="1"/>
-              <a:t>scalability</a:t>
-            </a:r>
-            <a:r>
-              <a:rPr lang="fr-BE" dirty="0"/>
-              <a:t> </a:t>
-            </a:r>
-          </a:p>
-          <a:p>
-            <a:pPr marL="457200" indent="-457200">
-              <a:buFont typeface="Arial" panose="020B0604020202020204" pitchFamily="34" charset="0"/>
-              <a:buChar char="•"/>
-            </a:pPr>
-            <a:endParaRPr lang="fr-BE" dirty="0"/>
-          </a:p>
-          <a:p>
-            <a:pPr marL="457200" indent="-457200">
-              <a:buFont typeface="Arial" panose="020B0604020202020204" pitchFamily="34" charset="0"/>
-              <a:buChar char="•"/>
-            </a:pPr>
-            <a:endParaRPr lang="fr-BE" dirty="0"/>
-          </a:p>
-          <a:p>
-            <a:pPr marL="457200" indent="-457200">
-              <a:buFont typeface="Arial" panose="020B0604020202020204" pitchFamily="34" charset="0"/>
-              <a:buChar char="•"/>
-            </a:pPr>
-            <a:endParaRPr lang="fr-BE" dirty="0"/>
-          </a:p>
-          <a:p>
-            <a:pPr marL="457200" indent="-457200">
-              <a:buFont typeface="Arial" panose="020B0604020202020204" pitchFamily="34" charset="0"/>
-              <a:buChar char="•"/>
-            </a:pPr>
-            <a:endParaRPr lang="fr-BE" dirty="0"/>
-          </a:p>
-          <a:p>
-            <a:pPr marL="457200" indent="-457200">
-              <a:buFont typeface="Arial" panose="020B0604020202020204" pitchFamily="34" charset="0"/>
-              <a:buChar char="•"/>
-            </a:pPr>
-            <a:endParaRPr lang="fr-BE" dirty="0"/>
-          </a:p>
-          <a:p>
-            <a:endParaRPr lang="fr-BE" dirty="0"/>
-          </a:p>
-          <a:p>
-            <a:endParaRPr lang="fr-FR" altLang="fr-FR" u="sng" dirty="0">
-              <a:ea typeface="ＭＳ Ｐゴシック" panose="020B0600070205080204" pitchFamily="34" charset="-128"/>
-            </a:endParaRPr>
-          </a:p>
-          <a:p>
-            <a:pPr eaLnBrk="1" hangingPunct="1"/>
-            <a:endParaRPr lang="fr-FR" altLang="fr-FR" u="sng" dirty="0">
-              <a:ea typeface="ＭＳ Ｐゴシック" panose="020B0600070205080204" pitchFamily="34" charset="-128"/>
-            </a:endParaRPr>
-          </a:p>
-          <a:p>
-            <a:pPr eaLnBrk="1" hangingPunct="1">
-              <a:buFont typeface="Arial" panose="020B0604020202020204" pitchFamily="34" charset="0"/>
-              <a:buNone/>
-            </a:pPr>
-            <a:endParaRPr lang="fr-FR" altLang="fr-FR" u="sng" dirty="0">
-              <a:ea typeface="ＭＳ Ｐゴシック" panose="020B0600070205080204" pitchFamily="34" charset="-128"/>
-            </a:endParaRPr>
-          </a:p>
-        </p:txBody>
-      </p:sp>
-      <p:sp>
-        <p:nvSpPr>
-          <p:cNvPr id="2" name="Espace réservé du numéro de diapositive 1">
-            <a:extLst>
-              <a:ext uri="{FF2B5EF4-FFF2-40B4-BE49-F238E27FC236}">
-                <a16:creationId xmlns:a16="http://schemas.microsoft.com/office/drawing/2014/main" id="{DCD75088-0863-48E7-808D-55EE80351927}"/>
-              </a:ext>
-            </a:extLst>
-          </p:cNvPr>
-          <p:cNvSpPr>
-            <a:spLocks noGrp="1"/>
-          </p:cNvSpPr>
-          <p:nvPr>
-            <p:ph type="sldNum" sz="quarter" idx="10"/>
-          </p:nvPr>
-        </p:nvSpPr>
-        <p:spPr>
-          <a:xfrm>
-            <a:off x="7010400" y="6583362"/>
-            <a:ext cx="2133600" cy="365125"/>
-          </a:xfrm>
-        </p:spPr>
-        <p:txBody>
-          <a:bodyPr/>
-          <a:lstStyle/>
-          <a:p>
-            <a:pPr>
-              <a:defRPr/>
-            </a:pPr>
-            <a:r>
-              <a:rPr lang="en-US" dirty="0">
-                <a:solidFill>
-                  <a:schemeClr val="bg1"/>
-                </a:solidFill>
-              </a:rPr>
-              <a:t>14</a:t>
             </a:r>
           </a:p>
         </p:txBody>
@@ -7578,7 +7374,7 @@
 </p:sld>
 </file>
 
-<file path=ppt/slides/slide2.xml><?xml version="1.0" encoding="utf-8"?>
+<file path=ppt/slides/slide19.xml><?xml version="1.0" encoding="utf-8"?>
 <p:sld xmlns:a="http://purl.oclc.org/ooxml/drawingml/main" xmlns:r="http://purl.oclc.org/ooxml/officeDocument/relationships" xmlns:p="http://purl.oclc.org/ooxml/presentationml/main">
   <p:cSld>
     <p:spTree>
@@ -7637,238 +7433,6 @@
           <a:p>
             <a:pPr algn="ctr" eaLnBrk="1" hangingPunct="1"/>
             <a:r>
-              <a:rPr lang="fr-FR" altLang="fr-FR" sz="3600" dirty="0">
-                <a:latin typeface="Verdana" panose="020B0604030504040204" pitchFamily="34" charset="0"/>
-                <a:ea typeface="ＭＳ Ｐゴシック" panose="020B0600070205080204" pitchFamily="34" charset="-128"/>
-              </a:rPr>
-              <a:t>Contents</a:t>
-            </a:r>
-          </a:p>
-        </p:txBody>
-      </p:sp>
-      <p:sp>
-        <p:nvSpPr>
-          <p:cNvPr id="3" name="Espace réservé du contenu 2"/>
-          <p:cNvSpPr>
-            <a:spLocks noGrp="1"/>
-          </p:cNvSpPr>
-          <p:nvPr>
-            <p:ph idx="1"/>
-          </p:nvPr>
-        </p:nvSpPr>
-        <p:spPr/>
-        <p:txBody>
-          <a:bodyPr vert="horz" wrap="square" lIns="91440" tIns="45720" rIns="91440" bIns="45720" numCol="1" anchor="t" anchorCtr="0" compatLnSpc="1">
-            <a:prstTxWarp prst="textNoShape">
-              <a:avLst/>
-            </a:prstTxWarp>
-          </a:bodyPr>
-          <a:lstStyle/>
-          <a:p>
-            <a:pPr marL="514350" indent="-514350" eaLnBrk="1" hangingPunct="1">
-              <a:buFont typeface="Arial" panose="020B0604020202020204" pitchFamily="34" charset="0"/>
-              <a:buAutoNum type="arabicPeriod"/>
-            </a:pPr>
-            <a:r>
-              <a:rPr lang="fr-FR" altLang="fr-FR" dirty="0">
-                <a:ea typeface="ＭＳ Ｐゴシック" panose="020B0600070205080204" pitchFamily="34" charset="-128"/>
-              </a:rPr>
-              <a:t>Introduction</a:t>
-            </a:r>
-          </a:p>
-          <a:p>
-            <a:pPr marL="514350" indent="-514350" eaLnBrk="1" hangingPunct="1">
-              <a:buFont typeface="Arial" panose="020B0604020202020204" pitchFamily="34" charset="0"/>
-              <a:buAutoNum type="arabicPeriod"/>
-            </a:pPr>
-            <a:r>
-              <a:rPr lang="fr-FR" altLang="fr-FR" dirty="0" err="1">
-                <a:ea typeface="ＭＳ Ｐゴシック" panose="020B0600070205080204" pitchFamily="34" charset="-128"/>
-              </a:rPr>
-              <a:t>Complex</a:t>
-            </a:r>
-            <a:r>
-              <a:rPr lang="fr-FR" altLang="fr-FR" dirty="0">
-                <a:ea typeface="ＭＳ Ｐゴシック" panose="020B0600070205080204" pitchFamily="34" charset="-128"/>
-              </a:rPr>
-              <a:t> Event </a:t>
-            </a:r>
-            <a:r>
-              <a:rPr lang="fr-FR" altLang="fr-FR" dirty="0" err="1">
-                <a:ea typeface="ＭＳ Ｐゴシック" panose="020B0600070205080204" pitchFamily="34" charset="-128"/>
-              </a:rPr>
-              <a:t>Processing</a:t>
-            </a:r>
-            <a:endParaRPr lang="fr-FR" altLang="fr-FR" dirty="0">
-              <a:ea typeface="ＭＳ Ｐゴシック" panose="020B0600070205080204" pitchFamily="34" charset="-128"/>
-            </a:endParaRPr>
-          </a:p>
-          <a:p>
-            <a:pPr marL="514350" indent="-514350" eaLnBrk="1" hangingPunct="1">
-              <a:buFont typeface="Arial" panose="020B0604020202020204" pitchFamily="34" charset="0"/>
-              <a:buAutoNum type="arabicPeriod"/>
-            </a:pPr>
-            <a:r>
-              <a:rPr lang="fr-FR" altLang="fr-FR" dirty="0" err="1">
-                <a:ea typeface="ＭＳ Ｐゴシック" panose="020B0600070205080204" pitchFamily="34" charset="-128"/>
-              </a:rPr>
-              <a:t>Computing</a:t>
-            </a:r>
-            <a:r>
-              <a:rPr lang="fr-FR" altLang="fr-FR" dirty="0">
-                <a:ea typeface="ＭＳ Ｐゴシック" panose="020B0600070205080204" pitchFamily="34" charset="-128"/>
-              </a:rPr>
-              <a:t> Levels</a:t>
-            </a:r>
-          </a:p>
-          <a:p>
-            <a:pPr marL="514350" indent="-514350" eaLnBrk="1" hangingPunct="1">
-              <a:buFont typeface="Arial" panose="020B0604020202020204" pitchFamily="34" charset="0"/>
-              <a:buAutoNum type="arabicPeriod"/>
-            </a:pPr>
-            <a:r>
-              <a:rPr lang="fr-FR" altLang="fr-FR" dirty="0" err="1">
-                <a:ea typeface="ＭＳ Ｐゴシック" panose="020B0600070205080204" pitchFamily="34" charset="-128"/>
-              </a:rPr>
-              <a:t>Problematisation</a:t>
-            </a:r>
-            <a:endParaRPr lang="fr-FR" altLang="fr-FR" dirty="0">
-              <a:ea typeface="ＭＳ Ｐゴシック" panose="020B0600070205080204" pitchFamily="34" charset="-128"/>
-            </a:endParaRPr>
-          </a:p>
-          <a:p>
-            <a:pPr marL="514350" indent="-514350" eaLnBrk="1" hangingPunct="1">
-              <a:buFont typeface="Arial" panose="020B0604020202020204" pitchFamily="34" charset="0"/>
-              <a:buAutoNum type="arabicPeriod"/>
-            </a:pPr>
-            <a:r>
-              <a:rPr lang="fr-FR" altLang="fr-FR" dirty="0">
-                <a:ea typeface="ＭＳ Ｐゴシック" panose="020B0600070205080204" pitchFamily="34" charset="-128"/>
-              </a:rPr>
-              <a:t>Conclusion</a:t>
-            </a:r>
-          </a:p>
-          <a:p>
-            <a:pPr marL="514350" indent="-514350" eaLnBrk="1" hangingPunct="1">
-              <a:buFont typeface="Arial" panose="020B0604020202020204" pitchFamily="34" charset="0"/>
-              <a:buAutoNum type="arabicPeriod"/>
-            </a:pPr>
-            <a:r>
-              <a:rPr lang="fr-FR" altLang="fr-FR" dirty="0">
-                <a:ea typeface="ＭＳ Ｐゴシック" panose="020B0600070205080204" pitchFamily="34" charset="-128"/>
-              </a:rPr>
-              <a:t>Questions</a:t>
-            </a:r>
-          </a:p>
-        </p:txBody>
-      </p:sp>
-      <p:sp>
-        <p:nvSpPr>
-          <p:cNvPr id="2" name="Espace réservé du numéro de diapositive 1">
-            <a:extLst>
-              <a:ext uri="{FF2B5EF4-FFF2-40B4-BE49-F238E27FC236}">
-                <a16:creationId xmlns:a16="http://schemas.microsoft.com/office/drawing/2014/main" id="{5C4BFE23-B3F5-4A6E-8883-654833289F91}"/>
-              </a:ext>
-            </a:extLst>
-          </p:cNvPr>
-          <p:cNvSpPr>
-            <a:spLocks noGrp="1"/>
-          </p:cNvSpPr>
-          <p:nvPr>
-            <p:ph type="sldNum" sz="quarter" idx="10"/>
-          </p:nvPr>
-        </p:nvSpPr>
-        <p:spPr>
-          <a:xfrm>
-            <a:off x="7010400" y="6536639"/>
-            <a:ext cx="2133600" cy="365125"/>
-          </a:xfrm>
-        </p:spPr>
-        <p:txBody>
-          <a:bodyPr/>
-          <a:lstStyle/>
-          <a:p>
-            <a:pPr>
-              <a:defRPr/>
-            </a:pPr>
-            <a:r>
-              <a:rPr lang="en-US" dirty="0">
-                <a:solidFill>
-                  <a:schemeClr val="bg1"/>
-                </a:solidFill>
-              </a:rPr>
-              <a:t>1</a:t>
-            </a:r>
-          </a:p>
-        </p:txBody>
-      </p:sp>
-    </p:spTree>
-  </p:cSld>
-  <p:clrMapOvr>
-    <a:masterClrMapping/>
-  </p:clrMapOvr>
-</p:sld>
-</file>
-
-<file path=ppt/slides/slide20.xml><?xml version="1.0" encoding="utf-8"?>
-<p:sld xmlns:a="http://purl.oclc.org/ooxml/drawingml/main" xmlns:r="http://purl.oclc.org/ooxml/officeDocument/relationships" xmlns:p="http://purl.oclc.org/ooxml/presentationml/main">
-  <p:cSld>
-    <p:spTree>
-      <p:nvGrpSpPr>
-        <p:cNvPr id="1" name=""/>
-        <p:cNvGrpSpPr/>
-        <p:nvPr/>
-      </p:nvGrpSpPr>
-      <p:grpSpPr>
-        <a:xfrm>
-          <a:off x="0" y="0"/>
-          <a:ext cx="0" cy="0"/>
-          <a:chOff x="0" y="0"/>
-          <a:chExt cx="0" cy="0"/>
-        </a:xfrm>
-      </p:grpSpPr>
-      <p:sp>
-        <p:nvSpPr>
-          <p:cNvPr id="9218" name="Titre 1"/>
-          <p:cNvSpPr>
-            <a:spLocks noGrp="1"/>
-          </p:cNvSpPr>
-          <p:nvPr>
-            <p:ph type="title"/>
-          </p:nvPr>
-        </p:nvSpPr>
-        <p:spPr bwMode="auto">
-          <a:noFill/>
-          <a:extLst>
-            <a:ext uri="{909E8E84-426E-40DD-AFC4-6F175D3DCCD1}">
-              <a14:hiddenFill xmlns:a14="http://schemas.microsoft.com/office/drawing/2010/main">
-                <a:solidFill>
-                  <a:srgbClr val="FFFFFF"/>
-                </a:solidFill>
-              </a14:hiddenFill>
-            </a:ext>
-            <a:ext uri="{91240B29-F687-4F45-9708-019B960494DF}">
-              <a14:hiddenLine xmlns:a14="http://schemas.microsoft.com/office/drawing/2010/main" w="9525">
-                <a:solidFill>
-                  <a:srgbClr val="000000"/>
-                </a:solidFill>
-                <a:miter lim="800%"/>
-                <a:headEnd/>
-                <a:tailEnd/>
-              </a14:hiddenLine>
-            </a:ext>
-          </a:extLst>
-        </p:spPr>
-        <p:txBody>
-          <a:bodyPr vert="horz" wrap="square" lIns="91440" tIns="45720" rIns="91440" bIns="45720" numCol="1" anchor="t" anchorCtr="0" compatLnSpc="1">
-            <a:prstTxWarp prst="textNoShape">
-              <a:avLst/>
-            </a:prstTxWarp>
-          </a:bodyPr>
-          <a:lstStyle/>
-          <a:p>
-            <a:pPr algn="ctr" eaLnBrk="1" hangingPunct="1"/>
-            <a:r>
               <a:rPr lang="fr-FR" sz="3600" dirty="0" err="1">
                 <a:latin typeface="Verdana" charset="0"/>
                 <a:cs typeface="Verdana" charset="0"/>
@@ -8038,7 +7602,7 @@
                   <a:schemeClr val="bg1"/>
                 </a:solidFill>
               </a:rPr>
-              <a:t>15</a:t>
+              <a:t>14</a:t>
             </a:r>
           </a:p>
         </p:txBody>
@@ -8085,7 +7649,7 @@
 </p:sld>
 </file>
 
-<file path=ppt/slides/slide21.xml><?xml version="1.0" encoding="utf-8"?>
+<file path=ppt/slides/slide2.xml><?xml version="1.0" encoding="utf-8"?>
 <p:sld xmlns:a="http://purl.oclc.org/ooxml/drawingml/main" xmlns:r="http://purl.oclc.org/ooxml/officeDocument/relationships" xmlns:p="http://purl.oclc.org/ooxml/presentationml/main">
   <p:cSld>
     <p:spTree>
@@ -8144,6 +7708,238 @@
           <a:p>
             <a:pPr algn="ctr" eaLnBrk="1" hangingPunct="1"/>
             <a:r>
+              <a:rPr lang="fr-FR" altLang="fr-FR" sz="3600" dirty="0">
+                <a:latin typeface="Verdana" panose="020B0604030504040204" pitchFamily="34" charset="0"/>
+                <a:ea typeface="ＭＳ Ｐゴシック" panose="020B0600070205080204" pitchFamily="34" charset="-128"/>
+              </a:rPr>
+              <a:t>Contents</a:t>
+            </a:r>
+          </a:p>
+        </p:txBody>
+      </p:sp>
+      <p:sp>
+        <p:nvSpPr>
+          <p:cNvPr id="3" name="Espace réservé du contenu 2"/>
+          <p:cNvSpPr>
+            <a:spLocks noGrp="1"/>
+          </p:cNvSpPr>
+          <p:nvPr>
+            <p:ph idx="1"/>
+          </p:nvPr>
+        </p:nvSpPr>
+        <p:spPr/>
+        <p:txBody>
+          <a:bodyPr vert="horz" wrap="square" lIns="91440" tIns="45720" rIns="91440" bIns="45720" numCol="1" anchor="t" anchorCtr="0" compatLnSpc="1">
+            <a:prstTxWarp prst="textNoShape">
+              <a:avLst/>
+            </a:prstTxWarp>
+          </a:bodyPr>
+          <a:lstStyle/>
+          <a:p>
+            <a:pPr marL="514350" indent="-514350" eaLnBrk="1" hangingPunct="1">
+              <a:buFont typeface="Arial" panose="020B0604020202020204" pitchFamily="34" charset="0"/>
+              <a:buAutoNum type="arabicPeriod"/>
+            </a:pPr>
+            <a:r>
+              <a:rPr lang="fr-FR" altLang="fr-FR" dirty="0">
+                <a:ea typeface="ＭＳ Ｐゴシック" panose="020B0600070205080204" pitchFamily="34" charset="-128"/>
+              </a:rPr>
+              <a:t>Introduction</a:t>
+            </a:r>
+          </a:p>
+          <a:p>
+            <a:pPr marL="514350" indent="-514350" eaLnBrk="1" hangingPunct="1">
+              <a:buFont typeface="Arial" panose="020B0604020202020204" pitchFamily="34" charset="0"/>
+              <a:buAutoNum type="arabicPeriod"/>
+            </a:pPr>
+            <a:r>
+              <a:rPr lang="fr-FR" altLang="fr-FR" dirty="0" err="1">
+                <a:ea typeface="ＭＳ Ｐゴシック" panose="020B0600070205080204" pitchFamily="34" charset="-128"/>
+              </a:rPr>
+              <a:t>Complex</a:t>
+            </a:r>
+            <a:r>
+              <a:rPr lang="fr-FR" altLang="fr-FR" dirty="0">
+                <a:ea typeface="ＭＳ Ｐゴシック" panose="020B0600070205080204" pitchFamily="34" charset="-128"/>
+              </a:rPr>
+              <a:t> Event </a:t>
+            </a:r>
+            <a:r>
+              <a:rPr lang="fr-FR" altLang="fr-FR" dirty="0" err="1">
+                <a:ea typeface="ＭＳ Ｐゴシック" panose="020B0600070205080204" pitchFamily="34" charset="-128"/>
+              </a:rPr>
+              <a:t>Processing</a:t>
+            </a:r>
+            <a:endParaRPr lang="fr-FR" altLang="fr-FR" dirty="0">
+              <a:ea typeface="ＭＳ Ｐゴシック" panose="020B0600070205080204" pitchFamily="34" charset="-128"/>
+            </a:endParaRPr>
+          </a:p>
+          <a:p>
+            <a:pPr marL="514350" indent="-514350" eaLnBrk="1" hangingPunct="1">
+              <a:buFont typeface="Arial" panose="020B0604020202020204" pitchFamily="34" charset="0"/>
+              <a:buAutoNum type="arabicPeriod"/>
+            </a:pPr>
+            <a:r>
+              <a:rPr lang="fr-FR" altLang="fr-FR" dirty="0" err="1">
+                <a:ea typeface="ＭＳ Ｐゴシック" panose="020B0600070205080204" pitchFamily="34" charset="-128"/>
+              </a:rPr>
+              <a:t>Computing</a:t>
+            </a:r>
+            <a:r>
+              <a:rPr lang="fr-FR" altLang="fr-FR" dirty="0">
+                <a:ea typeface="ＭＳ Ｐゴシック" panose="020B0600070205080204" pitchFamily="34" charset="-128"/>
+              </a:rPr>
+              <a:t> Levels</a:t>
+            </a:r>
+          </a:p>
+          <a:p>
+            <a:pPr marL="514350" indent="-514350" eaLnBrk="1" hangingPunct="1">
+              <a:buFont typeface="Arial" panose="020B0604020202020204" pitchFamily="34" charset="0"/>
+              <a:buAutoNum type="arabicPeriod"/>
+            </a:pPr>
+            <a:r>
+              <a:rPr lang="fr-FR" altLang="fr-FR" dirty="0" err="1">
+                <a:ea typeface="ＭＳ Ｐゴシック" panose="020B0600070205080204" pitchFamily="34" charset="-128"/>
+              </a:rPr>
+              <a:t>Problematisation</a:t>
+            </a:r>
+            <a:endParaRPr lang="fr-FR" altLang="fr-FR" dirty="0">
+              <a:ea typeface="ＭＳ Ｐゴシック" panose="020B0600070205080204" pitchFamily="34" charset="-128"/>
+            </a:endParaRPr>
+          </a:p>
+          <a:p>
+            <a:pPr marL="514350" indent="-514350" eaLnBrk="1" hangingPunct="1">
+              <a:buFont typeface="Arial" panose="020B0604020202020204" pitchFamily="34" charset="0"/>
+              <a:buAutoNum type="arabicPeriod"/>
+            </a:pPr>
+            <a:r>
+              <a:rPr lang="fr-FR" altLang="fr-FR" dirty="0">
+                <a:ea typeface="ＭＳ Ｐゴシック" panose="020B0600070205080204" pitchFamily="34" charset="-128"/>
+              </a:rPr>
+              <a:t>Conclusion</a:t>
+            </a:r>
+          </a:p>
+          <a:p>
+            <a:pPr marL="514350" indent="-514350" eaLnBrk="1" hangingPunct="1">
+              <a:buFont typeface="Arial" panose="020B0604020202020204" pitchFamily="34" charset="0"/>
+              <a:buAutoNum type="arabicPeriod"/>
+            </a:pPr>
+            <a:r>
+              <a:rPr lang="fr-FR" altLang="fr-FR" dirty="0">
+                <a:ea typeface="ＭＳ Ｐゴシック" panose="020B0600070205080204" pitchFamily="34" charset="-128"/>
+              </a:rPr>
+              <a:t>Questions</a:t>
+            </a:r>
+          </a:p>
+        </p:txBody>
+      </p:sp>
+      <p:sp>
+        <p:nvSpPr>
+          <p:cNvPr id="2" name="Espace réservé du numéro de diapositive 1">
+            <a:extLst>
+              <a:ext uri="{FF2B5EF4-FFF2-40B4-BE49-F238E27FC236}">
+                <a16:creationId xmlns:a16="http://schemas.microsoft.com/office/drawing/2014/main" id="{5C4BFE23-B3F5-4A6E-8883-654833289F91}"/>
+              </a:ext>
+            </a:extLst>
+          </p:cNvPr>
+          <p:cNvSpPr>
+            <a:spLocks noGrp="1"/>
+          </p:cNvSpPr>
+          <p:nvPr>
+            <p:ph type="sldNum" sz="quarter" idx="10"/>
+          </p:nvPr>
+        </p:nvSpPr>
+        <p:spPr>
+          <a:xfrm>
+            <a:off x="7010400" y="6536639"/>
+            <a:ext cx="2133600" cy="365125"/>
+          </a:xfrm>
+        </p:spPr>
+        <p:txBody>
+          <a:bodyPr/>
+          <a:lstStyle/>
+          <a:p>
+            <a:pPr>
+              <a:defRPr/>
+            </a:pPr>
+            <a:r>
+              <a:rPr lang="en-US" dirty="0">
+                <a:solidFill>
+                  <a:schemeClr val="bg1"/>
+                </a:solidFill>
+              </a:rPr>
+              <a:t>1</a:t>
+            </a:r>
+          </a:p>
+        </p:txBody>
+      </p:sp>
+    </p:spTree>
+  </p:cSld>
+  <p:clrMapOvr>
+    <a:masterClrMapping/>
+  </p:clrMapOvr>
+</p:sld>
+</file>
+
+<file path=ppt/slides/slide20.xml><?xml version="1.0" encoding="utf-8"?>
+<p:sld xmlns:a="http://purl.oclc.org/ooxml/drawingml/main" xmlns:r="http://purl.oclc.org/ooxml/officeDocument/relationships" xmlns:p="http://purl.oclc.org/ooxml/presentationml/main">
+  <p:cSld>
+    <p:spTree>
+      <p:nvGrpSpPr>
+        <p:cNvPr id="1" name=""/>
+        <p:cNvGrpSpPr/>
+        <p:nvPr/>
+      </p:nvGrpSpPr>
+      <p:grpSpPr>
+        <a:xfrm>
+          <a:off x="0" y="0"/>
+          <a:ext cx="0" cy="0"/>
+          <a:chOff x="0" y="0"/>
+          <a:chExt cx="0" cy="0"/>
+        </a:xfrm>
+      </p:grpSpPr>
+      <p:sp>
+        <p:nvSpPr>
+          <p:cNvPr id="9218" name="Titre 1"/>
+          <p:cNvSpPr>
+            <a:spLocks noGrp="1"/>
+          </p:cNvSpPr>
+          <p:nvPr>
+            <p:ph type="title"/>
+          </p:nvPr>
+        </p:nvSpPr>
+        <p:spPr bwMode="auto">
+          <a:noFill/>
+          <a:extLst>
+            <a:ext uri="{909E8E84-426E-40DD-AFC4-6F175D3DCCD1}">
+              <a14:hiddenFill xmlns:a14="http://schemas.microsoft.com/office/drawing/2010/main">
+                <a:solidFill>
+                  <a:srgbClr val="FFFFFF"/>
+                </a:solidFill>
+              </a14:hiddenFill>
+            </a:ext>
+            <a:ext uri="{91240B29-F687-4F45-9708-019B960494DF}">
+              <a14:hiddenLine xmlns:a14="http://schemas.microsoft.com/office/drawing/2010/main" w="9525">
+                <a:solidFill>
+                  <a:srgbClr val="000000"/>
+                </a:solidFill>
+                <a:miter lim="800%"/>
+                <a:headEnd/>
+                <a:tailEnd/>
+              </a14:hiddenLine>
+            </a:ext>
+          </a:extLst>
+        </p:spPr>
+        <p:txBody>
+          <a:bodyPr vert="horz" wrap="square" lIns="91440" tIns="45720" rIns="91440" bIns="45720" numCol="1" anchor="t" anchorCtr="0" compatLnSpc="1">
+            <a:prstTxWarp prst="textNoShape">
+              <a:avLst/>
+            </a:prstTxWarp>
+          </a:bodyPr>
+          <a:lstStyle/>
+          <a:p>
+            <a:pPr algn="ctr" eaLnBrk="1" hangingPunct="1"/>
+            <a:r>
               <a:rPr lang="fr-FR" sz="3600" dirty="0" err="1">
                 <a:latin typeface="Verdana" charset="0"/>
                 <a:cs typeface="Verdana" charset="0"/>
@@ -8271,7 +8067,7 @@
                   <a:schemeClr val="bg1"/>
                 </a:solidFill>
               </a:rPr>
-              <a:t>16</a:t>
+              <a:t>15</a:t>
             </a:r>
           </a:p>
         </p:txBody>
@@ -8332,7 +8128,7 @@
 </p:sld>
 </file>
 
-<file path=ppt/slides/slide22.xml><?xml version="1.0" encoding="utf-8"?>
+<file path=ppt/slides/slide21.xml><?xml version="1.0" encoding="utf-8"?>
 <p:sld xmlns:a="http://purl.oclc.org/ooxml/drawingml/main" xmlns:r="http://purl.oclc.org/ooxml/officeDocument/relationships" xmlns:p="http://purl.oclc.org/ooxml/presentationml/main">
   <p:cSld>
     <p:spTree>
@@ -8494,7 +8290,7 @@
                   <a:schemeClr val="bg1"/>
                 </a:solidFill>
               </a:rPr>
-              <a:t>17</a:t>
+              <a:t>16</a:t>
             </a:r>
           </a:p>
         </p:txBody>
@@ -8542,7 +8338,7 @@
 </p:sld>
 </file>
 
-<file path=ppt/slides/slide23.xml><?xml version="1.0" encoding="utf-8"?>
+<file path=ppt/slides/slide22.xml><?xml version="1.0" encoding="utf-8"?>
 <p:sld xmlns:a="http://purl.oclc.org/ooxml/drawingml/main" xmlns:r="http://purl.oclc.org/ooxml/officeDocument/relationships" xmlns:p="http://purl.oclc.org/ooxml/presentationml/main">
   <p:cSld>
     <p:spTree>
@@ -8716,7 +8512,7 @@
                   <a:schemeClr val="bg1"/>
                 </a:solidFill>
               </a:rPr>
-              <a:t>18</a:t>
+              <a:t>17</a:t>
             </a:r>
           </a:p>
         </p:txBody>
@@ -8764,7 +8560,7 @@
 </p:sld>
 </file>
 
-<file path=ppt/slides/slide24.xml><?xml version="1.0" encoding="utf-8"?>
+<file path=ppt/slides/slide23.xml><?xml version="1.0" encoding="utf-8"?>
 <p:sld xmlns:a="http://purl.oclc.org/ooxml/drawingml/main" xmlns:r="http://purl.oclc.org/ooxml/officeDocument/relationships" xmlns:p="http://purl.oclc.org/ooxml/presentationml/main">
   <p:cSld>
     <p:spTree>
@@ -8805,14 +8601,14 @@
           <a:noFill/>
           <a:extLst>
             <a:ext uri="{909E8E84-426E-40dd-AFC4-6F175D3DCCD1}">
-              <a14:hiddenFill xmlns:a14="http://schemas.microsoft.com/office/drawing/2010/main" xmlns:p="http://schemas.openxmlformats.org/presentationml/2006/main" xmlns:r="http://schemas.openxmlformats.org/officeDocument/2006/relationships" xmlns:a="http://schemas.openxmlformats.org/drawingml/2006/main" xmlns="">
+              <a14:hiddenFill xmlns="" xmlns:a="http://schemas.openxmlformats.org/drawingml/2006/main" xmlns:r="http://schemas.openxmlformats.org/officeDocument/2006/relationships" xmlns:p="http://schemas.openxmlformats.org/presentationml/2006/main" xmlns:a14="http://schemas.microsoft.com/office/drawing/2010/main">
                 <a:solidFill>
                   <a:srgbClr val="FFFFFF"/>
                 </a:solidFill>
               </a14:hiddenFill>
             </a:ext>
             <a:ext uri="{91240B29-F687-4f45-9708-019B960494DF}">
-              <a14:hiddenLine xmlns:a14="http://schemas.microsoft.com/office/drawing/2010/main" xmlns:p="http://schemas.openxmlformats.org/presentationml/2006/main" xmlns:r="http://schemas.openxmlformats.org/officeDocument/2006/relationships" xmlns:a="http://schemas.openxmlformats.org/drawingml/2006/main" xmlns="" w="9525">
+              <a14:hiddenLine xmlns="" xmlns:a="http://schemas.openxmlformats.org/drawingml/2006/main" xmlns:r="http://schemas.openxmlformats.org/officeDocument/2006/relationships" xmlns:p="http://schemas.openxmlformats.org/presentationml/2006/main" xmlns:a14="http://schemas.microsoft.com/office/drawing/2010/main" w="9525">
                 <a:solidFill>
                   <a:srgbClr val="000000"/>
                 </a:solidFill>
@@ -8822,7 +8618,7 @@
               </a14:hiddenLine>
             </a:ext>
             <a:ext uri="{FAA26D3D-D897-4be2-8F04-BA451C77F1D7}">
-              <ma14:placeholderFlag xmlns:ma14="http://schemas.microsoft.com/office/mac/drawingml/2011/main" xmlns:p="http://schemas.openxmlformats.org/presentationml/2006/main" xmlns:r="http://schemas.openxmlformats.org/officeDocument/2006/relationships" xmlns:a="http://schemas.openxmlformats.org/drawingml/2006/main" xmlns="" val="1"/>
+              <ma14:placeholderFlag xmlns="" xmlns:a="http://schemas.openxmlformats.org/drawingml/2006/main" xmlns:r="http://schemas.openxmlformats.org/officeDocument/2006/relationships" xmlns:p="http://schemas.openxmlformats.org/presentationml/2006/main" xmlns:ma14="http://schemas.microsoft.com/office/mac/drawingml/2011/main" val="1"/>
             </a:ext>
           </a:extLst>
         </p:spPr>
@@ -8867,7 +8663,7 @@
 </p:sld>
 </file>
 
-<file path=ppt/slides/slide25.xml><?xml version="1.0" encoding="utf-8"?>
+<file path=ppt/slides/slide24.xml><?xml version="1.0" encoding="utf-8"?>
 <p:sld xmlns:a="http://purl.oclc.org/ooxml/drawingml/main" xmlns:r="http://purl.oclc.org/ooxml/officeDocument/relationships" xmlns:p="http://purl.oclc.org/ooxml/presentationml/main">
   <p:cSld>
     <p:spTree>
@@ -8999,7 +8795,7 @@
                   <a:schemeClr val="bg1"/>
                 </a:solidFill>
               </a:rPr>
-              <a:t>19</a:t>
+              <a:t>18</a:t>
             </a:r>
           </a:p>
         </p:txBody>
@@ -9017,7 +8813,7 @@
 </p:sld>
 </file>
 
-<file path=ppt/slides/slide26.xml><?xml version="1.0" encoding="utf-8"?>
+<file path=ppt/slides/slide25.xml><?xml version="1.0" encoding="utf-8"?>
 <p:sld xmlns:a="http://purl.oclc.org/ooxml/drawingml/main" xmlns:r="http://purl.oclc.org/ooxml/officeDocument/relationships" xmlns:p="http://purl.oclc.org/ooxml/presentationml/main">
   <p:cSld>
     <p:spTree>
@@ -9058,14 +8854,14 @@
           <a:noFill/>
           <a:extLst>
             <a:ext uri="{909E8E84-426E-40dd-AFC4-6F175D3DCCD1}">
-              <a14:hiddenFill xmlns:a14="http://schemas.microsoft.com/office/drawing/2010/main" xmlns:p="http://schemas.openxmlformats.org/presentationml/2006/main" xmlns:r="http://schemas.openxmlformats.org/officeDocument/2006/relationships" xmlns:a="http://schemas.openxmlformats.org/drawingml/2006/main" xmlns="">
+              <a14:hiddenFill xmlns="" xmlns:a="http://schemas.openxmlformats.org/drawingml/2006/main" xmlns:r="http://schemas.openxmlformats.org/officeDocument/2006/relationships" xmlns:p="http://schemas.openxmlformats.org/presentationml/2006/main" xmlns:a14="http://schemas.microsoft.com/office/drawing/2010/main">
                 <a:solidFill>
                   <a:srgbClr val="FFFFFF"/>
                 </a:solidFill>
               </a14:hiddenFill>
             </a:ext>
             <a:ext uri="{91240B29-F687-4f45-9708-019B960494DF}">
-              <a14:hiddenLine xmlns:a14="http://schemas.microsoft.com/office/drawing/2010/main" xmlns:p="http://schemas.openxmlformats.org/presentationml/2006/main" xmlns:r="http://schemas.openxmlformats.org/officeDocument/2006/relationships" xmlns:a="http://schemas.openxmlformats.org/drawingml/2006/main" xmlns="" w="9525">
+              <a14:hiddenLine xmlns="" xmlns:a="http://schemas.openxmlformats.org/drawingml/2006/main" xmlns:r="http://schemas.openxmlformats.org/officeDocument/2006/relationships" xmlns:p="http://schemas.openxmlformats.org/presentationml/2006/main" xmlns:a14="http://schemas.microsoft.com/office/drawing/2010/main" w="9525">
                 <a:solidFill>
                   <a:srgbClr val="000000"/>
                 </a:solidFill>
@@ -9075,7 +8871,7 @@
               </a14:hiddenLine>
             </a:ext>
             <a:ext uri="{FAA26D3D-D897-4be2-8F04-BA451C77F1D7}">
-              <ma14:placeholderFlag xmlns:ma14="http://schemas.microsoft.com/office/mac/drawingml/2011/main" xmlns:p="http://schemas.openxmlformats.org/presentationml/2006/main" xmlns:r="http://schemas.openxmlformats.org/officeDocument/2006/relationships" xmlns:a="http://schemas.openxmlformats.org/drawingml/2006/main" xmlns="" val="1"/>
+              <ma14:placeholderFlag xmlns="" xmlns:a="http://schemas.openxmlformats.org/drawingml/2006/main" xmlns:r="http://schemas.openxmlformats.org/officeDocument/2006/relationships" xmlns:p="http://schemas.openxmlformats.org/presentationml/2006/main" xmlns:ma14="http://schemas.microsoft.com/office/mac/drawingml/2011/main" val="1"/>
             </a:ext>
           </a:extLst>
         </p:spPr>
@@ -9120,7 +8916,7 @@
 </p:sld>
 </file>
 
-<file path=ppt/slides/slide27.xml><?xml version="1.0" encoding="utf-8"?>
+<file path=ppt/slides/slide26.xml><?xml version="1.0" encoding="utf-8"?>
 <p:sld xmlns:a="http://purl.oclc.org/ooxml/drawingml/main" xmlns:r="http://purl.oclc.org/ooxml/officeDocument/relationships" xmlns:p="http://purl.oclc.org/ooxml/presentationml/main">
   <p:cSld>
     <p:spTree>
@@ -9252,7 +9048,7 @@
                   <a:schemeClr val="bg1"/>
                 </a:solidFill>
               </a:rPr>
-              <a:t>20</a:t>
+              <a:t>19</a:t>
             </a:r>
           </a:p>
         </p:txBody>
@@ -9311,14 +9107,14 @@
           <a:noFill/>
           <a:extLst>
             <a:ext uri="{909E8E84-426E-40dd-AFC4-6F175D3DCCD1}">
-              <a14:hiddenFill xmlns:a14="http://schemas.microsoft.com/office/drawing/2010/main" xmlns:p="http://schemas.openxmlformats.org/presentationml/2006/main" xmlns:r="http://schemas.openxmlformats.org/officeDocument/2006/relationships" xmlns:a="http://schemas.openxmlformats.org/drawingml/2006/main" xmlns="">
+              <a14:hiddenFill xmlns="" xmlns:a="http://schemas.openxmlformats.org/drawingml/2006/main" xmlns:r="http://schemas.openxmlformats.org/officeDocument/2006/relationships" xmlns:p="http://schemas.openxmlformats.org/presentationml/2006/main" xmlns:a14="http://schemas.microsoft.com/office/drawing/2010/main">
                 <a:solidFill>
                   <a:srgbClr val="FFFFFF"/>
                 </a:solidFill>
               </a14:hiddenFill>
             </a:ext>
             <a:ext uri="{91240B29-F687-4f45-9708-019B960494DF}">
-              <a14:hiddenLine xmlns:a14="http://schemas.microsoft.com/office/drawing/2010/main" xmlns:p="http://schemas.openxmlformats.org/presentationml/2006/main" xmlns:r="http://schemas.openxmlformats.org/officeDocument/2006/relationships" xmlns:a="http://schemas.openxmlformats.org/drawingml/2006/main" xmlns="" w="9525">
+              <a14:hiddenLine xmlns="" xmlns:a="http://schemas.openxmlformats.org/drawingml/2006/main" xmlns:r="http://schemas.openxmlformats.org/officeDocument/2006/relationships" xmlns:p="http://schemas.openxmlformats.org/presentationml/2006/main" xmlns:a14="http://schemas.microsoft.com/office/drawing/2010/main" w="9525">
                 <a:solidFill>
                   <a:srgbClr val="000000"/>
                 </a:solidFill>
@@ -9328,7 +9124,7 @@
               </a14:hiddenLine>
             </a:ext>
             <a:ext uri="{FAA26D3D-D897-4be2-8F04-BA451C77F1D7}">
-              <ma14:placeholderFlag xmlns:ma14="http://schemas.microsoft.com/office/mac/drawingml/2011/main" xmlns:p="http://schemas.openxmlformats.org/presentationml/2006/main" xmlns:r="http://schemas.openxmlformats.org/officeDocument/2006/relationships" xmlns:a="http://schemas.openxmlformats.org/drawingml/2006/main" xmlns="" val="1"/>
+              <ma14:placeholderFlag xmlns="" xmlns:a="http://schemas.openxmlformats.org/drawingml/2006/main" xmlns:r="http://schemas.openxmlformats.org/officeDocument/2006/relationships" xmlns:p="http://schemas.openxmlformats.org/presentationml/2006/main" xmlns:ma14="http://schemas.microsoft.com/office/mac/drawingml/2011/main" val="1"/>
             </a:ext>
           </a:extLst>
         </p:spPr>
@@ -10086,14 +9882,14 @@
           <a:noFill/>
           <a:extLst>
             <a:ext uri="{909E8E84-426E-40dd-AFC4-6F175D3DCCD1}">
-              <a14:hiddenFill xmlns:a14="http://schemas.microsoft.com/office/drawing/2010/main" xmlns:p="http://schemas.openxmlformats.org/presentationml/2006/main" xmlns:r="http://schemas.openxmlformats.org/officeDocument/2006/relationships" xmlns:a="http://schemas.openxmlformats.org/drawingml/2006/main" xmlns="">
+              <a14:hiddenFill xmlns="" xmlns:a="http://schemas.openxmlformats.org/drawingml/2006/main" xmlns:r="http://schemas.openxmlformats.org/officeDocument/2006/relationships" xmlns:p="http://schemas.openxmlformats.org/presentationml/2006/main" xmlns:a14="http://schemas.microsoft.com/office/drawing/2010/main">
                 <a:solidFill>
                   <a:srgbClr val="FFFFFF"/>
                 </a:solidFill>
               </a14:hiddenFill>
             </a:ext>
             <a:ext uri="{91240B29-F687-4f45-9708-019B960494DF}">
-              <a14:hiddenLine xmlns:a14="http://schemas.microsoft.com/office/drawing/2010/main" xmlns:p="http://schemas.openxmlformats.org/presentationml/2006/main" xmlns:r="http://schemas.openxmlformats.org/officeDocument/2006/relationships" xmlns:a="http://schemas.openxmlformats.org/drawingml/2006/main" xmlns="" w="9525">
+              <a14:hiddenLine xmlns="" xmlns:a="http://schemas.openxmlformats.org/drawingml/2006/main" xmlns:r="http://schemas.openxmlformats.org/officeDocument/2006/relationships" xmlns:p="http://schemas.openxmlformats.org/presentationml/2006/main" xmlns:a14="http://schemas.microsoft.com/office/drawing/2010/main" w="9525">
                 <a:solidFill>
                   <a:srgbClr val="000000"/>
                 </a:solidFill>
@@ -10103,7 +9899,7 @@
               </a14:hiddenLine>
             </a:ext>
             <a:ext uri="{FAA26D3D-D897-4be2-8F04-BA451C77F1D7}">
-              <ma14:placeholderFlag xmlns:ma14="http://schemas.microsoft.com/office/mac/drawingml/2011/main" xmlns:p="http://schemas.openxmlformats.org/presentationml/2006/main" xmlns:r="http://schemas.openxmlformats.org/officeDocument/2006/relationships" xmlns:a="http://schemas.openxmlformats.org/drawingml/2006/main" xmlns="" val="1"/>
+              <ma14:placeholderFlag xmlns="" xmlns:a="http://schemas.openxmlformats.org/drawingml/2006/main" xmlns:r="http://schemas.openxmlformats.org/officeDocument/2006/relationships" xmlns:p="http://schemas.openxmlformats.org/presentationml/2006/main" xmlns:ma14="http://schemas.microsoft.com/office/mac/drawingml/2011/main" val="1"/>
             </a:ext>
           </a:extLst>
         </p:spPr>

</xml_diff>